<commit_message>
Add example interface session and figs
</commit_message>
<xml_diff>
--- a/figures/structures/protein_structure_figures.pptx
+++ b/figures/structures/protein_structure_figures.pptx
@@ -6,6 +6,7 @@
   </p:sldMasterIdLst>
   <p:sldIdLst>
     <p:sldId id="256" r:id="rId2"/>
+    <p:sldId id="257" r:id="rId3"/>
   </p:sldIdLst>
   <p:sldSz cx="12192000" cy="6858000"/>
   <p:notesSz cx="6858000" cy="9144000"/>
@@ -184,35 +185,35 @@
               <a:buNone/>
               <a:defRPr sz="2400"/>
             </a:lvl1pPr>
-            <a:lvl2pPr marL="457200" indent="0" algn="ctr">
+            <a:lvl2pPr marL="457206" indent="0" algn="ctr">
               <a:buNone/>
               <a:defRPr sz="2000"/>
             </a:lvl2pPr>
-            <a:lvl3pPr marL="914400" indent="0" algn="ctr">
-              <a:buNone/>
-              <a:defRPr sz="1800"/>
+            <a:lvl3pPr marL="914411" indent="0" algn="ctr">
+              <a:buNone/>
+              <a:defRPr sz="1801"/>
             </a:lvl3pPr>
-            <a:lvl4pPr marL="1371600" indent="0" algn="ctr">
+            <a:lvl4pPr marL="1371617" indent="0" algn="ctr">
               <a:buNone/>
               <a:defRPr sz="1600"/>
             </a:lvl4pPr>
-            <a:lvl5pPr marL="1828800" indent="0" algn="ctr">
+            <a:lvl5pPr marL="1828823" indent="0" algn="ctr">
               <a:buNone/>
               <a:defRPr sz="1600"/>
             </a:lvl5pPr>
-            <a:lvl6pPr marL="2286000" indent="0" algn="ctr">
+            <a:lvl6pPr marL="2286029" indent="0" algn="ctr">
               <a:buNone/>
               <a:defRPr sz="1600"/>
             </a:lvl6pPr>
-            <a:lvl7pPr marL="2743200" indent="0" algn="ctr">
+            <a:lvl7pPr marL="2743234" indent="0" algn="ctr">
               <a:buNone/>
               <a:defRPr sz="1600"/>
             </a:lvl7pPr>
-            <a:lvl8pPr marL="3200400" indent="0" algn="ctr">
+            <a:lvl8pPr marL="3200440" indent="0" algn="ctr">
               <a:buNone/>
               <a:defRPr sz="1600"/>
             </a:lvl8pPr>
-            <a:lvl9pPr marL="3657600" indent="0" algn="ctr">
+            <a:lvl9pPr marL="3657646" indent="0" algn="ctr">
               <a:buNone/>
               <a:defRPr sz="1600"/>
             </a:lvl9pPr>
@@ -503,7 +504,7 @@
         </p:nvSpPr>
         <p:spPr>
           <a:xfrm>
-            <a:off x="8724900" y="365125"/>
+            <a:off x="8724899" y="365125"/>
             <a:ext cx="2628900" cy="5811838"/>
           </a:xfrm>
         </p:spPr>
@@ -531,7 +532,7 @@
         </p:nvSpPr>
         <p:spPr>
           <a:xfrm>
-            <a:off x="838200" y="365125"/>
+            <a:off x="838199" y="365125"/>
             <a:ext cx="7734300" cy="5811838"/>
           </a:xfrm>
         </p:spPr>
@@ -853,7 +854,7 @@
         </p:nvSpPr>
         <p:spPr>
           <a:xfrm>
-            <a:off x="831850" y="1709738"/>
+            <a:off x="831852" y="1709738"/>
             <a:ext cx="10515600" cy="2852737"/>
           </a:xfrm>
         </p:spPr>
@@ -885,7 +886,7 @@
         </p:nvSpPr>
         <p:spPr>
           <a:xfrm>
-            <a:off x="831850" y="4589463"/>
+            <a:off x="831852" y="4589464"/>
             <a:ext cx="10515600" cy="1500187"/>
           </a:xfrm>
         </p:spPr>
@@ -902,7 +903,7 @@
                 </a:solidFill>
               </a:defRPr>
             </a:lvl1pPr>
-            <a:lvl2pPr marL="457200" indent="0">
+            <a:lvl2pPr marL="457206" indent="0">
               <a:buNone/>
               <a:defRPr sz="2000">
                 <a:solidFill>
@@ -912,9 +913,9 @@
                 </a:solidFill>
               </a:defRPr>
             </a:lvl2pPr>
-            <a:lvl3pPr marL="914400" indent="0">
-              <a:buNone/>
-              <a:defRPr sz="1800">
+            <a:lvl3pPr marL="914411" indent="0">
+              <a:buNone/>
+              <a:defRPr sz="1801">
                 <a:solidFill>
                   <a:schemeClr val="tx1">
                     <a:tint val="82000"/>
@@ -922,7 +923,7 @@
                 </a:solidFill>
               </a:defRPr>
             </a:lvl3pPr>
-            <a:lvl4pPr marL="1371600" indent="0">
+            <a:lvl4pPr marL="1371617" indent="0">
               <a:buNone/>
               <a:defRPr sz="1600">
                 <a:solidFill>
@@ -932,7 +933,7 @@
                 </a:solidFill>
               </a:defRPr>
             </a:lvl4pPr>
-            <a:lvl5pPr marL="1828800" indent="0">
+            <a:lvl5pPr marL="1828823" indent="0">
               <a:buNone/>
               <a:defRPr sz="1600">
                 <a:solidFill>
@@ -942,7 +943,7 @@
                 </a:solidFill>
               </a:defRPr>
             </a:lvl5pPr>
-            <a:lvl6pPr marL="2286000" indent="0">
+            <a:lvl6pPr marL="2286029" indent="0">
               <a:buNone/>
               <a:defRPr sz="1600">
                 <a:solidFill>
@@ -952,7 +953,7 @@
                 </a:solidFill>
               </a:defRPr>
             </a:lvl6pPr>
-            <a:lvl7pPr marL="2743200" indent="0">
+            <a:lvl7pPr marL="2743234" indent="0">
               <a:buNone/>
               <a:defRPr sz="1600">
                 <a:solidFill>
@@ -962,7 +963,7 @@
                 </a:solidFill>
               </a:defRPr>
             </a:lvl7pPr>
-            <a:lvl8pPr marL="3200400" indent="0">
+            <a:lvl8pPr marL="3200440" indent="0">
               <a:buNone/>
               <a:defRPr sz="1600">
                 <a:solidFill>
@@ -972,7 +973,7 @@
                 </a:solidFill>
               </a:defRPr>
             </a:lvl8pPr>
-            <a:lvl9pPr marL="3657600" indent="0">
+            <a:lvl9pPr marL="3657646" indent="0">
               <a:buNone/>
               <a:defRPr sz="1600">
                 <a:solidFill>
@@ -1122,7 +1123,7 @@
         </p:nvSpPr>
         <p:spPr>
           <a:xfrm>
-            <a:off x="838200" y="1825625"/>
+            <a:off x="838201" y="1825625"/>
             <a:ext cx="5181600" cy="4351338"/>
           </a:xfrm>
         </p:spPr>
@@ -1179,7 +1180,7 @@
         </p:nvSpPr>
         <p:spPr>
           <a:xfrm>
-            <a:off x="6172200" y="1825625"/>
+            <a:off x="6172201" y="1825625"/>
             <a:ext cx="5181600" cy="4351338"/>
           </a:xfrm>
         </p:spPr>
@@ -1331,7 +1332,7 @@
         </p:nvSpPr>
         <p:spPr>
           <a:xfrm>
-            <a:off x="839788" y="365125"/>
+            <a:off x="839789" y="365125"/>
             <a:ext cx="10515600" cy="1325563"/>
           </a:xfrm>
         </p:spPr>
@@ -1359,7 +1360,7 @@
         </p:nvSpPr>
         <p:spPr>
           <a:xfrm>
-            <a:off x="839788" y="1681163"/>
+            <a:off x="839789" y="1681163"/>
             <a:ext cx="5157787" cy="823912"/>
           </a:xfrm>
         </p:spPr>
@@ -1370,35 +1371,35 @@
               <a:buNone/>
               <a:defRPr sz="2400" b="1"/>
             </a:lvl1pPr>
-            <a:lvl2pPr marL="457200" indent="0">
+            <a:lvl2pPr marL="457206" indent="0">
               <a:buNone/>
               <a:defRPr sz="2000" b="1"/>
             </a:lvl2pPr>
-            <a:lvl3pPr marL="914400" indent="0">
-              <a:buNone/>
-              <a:defRPr sz="1800" b="1"/>
+            <a:lvl3pPr marL="914411" indent="0">
+              <a:buNone/>
+              <a:defRPr sz="1801" b="1"/>
             </a:lvl3pPr>
-            <a:lvl4pPr marL="1371600" indent="0">
+            <a:lvl4pPr marL="1371617" indent="0">
               <a:buNone/>
               <a:defRPr sz="1600" b="1"/>
             </a:lvl4pPr>
-            <a:lvl5pPr marL="1828800" indent="0">
+            <a:lvl5pPr marL="1828823" indent="0">
               <a:buNone/>
               <a:defRPr sz="1600" b="1"/>
             </a:lvl5pPr>
-            <a:lvl6pPr marL="2286000" indent="0">
+            <a:lvl6pPr marL="2286029" indent="0">
               <a:buNone/>
               <a:defRPr sz="1600" b="1"/>
             </a:lvl6pPr>
-            <a:lvl7pPr marL="2743200" indent="0">
+            <a:lvl7pPr marL="2743234" indent="0">
               <a:buNone/>
               <a:defRPr sz="1600" b="1"/>
             </a:lvl7pPr>
-            <a:lvl8pPr marL="3200400" indent="0">
+            <a:lvl8pPr marL="3200440" indent="0">
               <a:buNone/>
               <a:defRPr sz="1600" b="1"/>
             </a:lvl8pPr>
-            <a:lvl9pPr marL="3657600" indent="0">
+            <a:lvl9pPr marL="3657646" indent="0">
               <a:buNone/>
               <a:defRPr sz="1600" b="1"/>
             </a:lvl9pPr>
@@ -1424,7 +1425,7 @@
         </p:nvSpPr>
         <p:spPr>
           <a:xfrm>
-            <a:off x="839788" y="2505075"/>
+            <a:off x="839789" y="2505076"/>
             <a:ext cx="5157787" cy="3684588"/>
           </a:xfrm>
         </p:spPr>
@@ -1481,7 +1482,7 @@
         </p:nvSpPr>
         <p:spPr>
           <a:xfrm>
-            <a:off x="6172200" y="1681163"/>
+            <a:off x="6172202" y="1681163"/>
             <a:ext cx="5183188" cy="823912"/>
           </a:xfrm>
         </p:spPr>
@@ -1492,35 +1493,35 @@
               <a:buNone/>
               <a:defRPr sz="2400" b="1"/>
             </a:lvl1pPr>
-            <a:lvl2pPr marL="457200" indent="0">
+            <a:lvl2pPr marL="457206" indent="0">
               <a:buNone/>
               <a:defRPr sz="2000" b="1"/>
             </a:lvl2pPr>
-            <a:lvl3pPr marL="914400" indent="0">
-              <a:buNone/>
-              <a:defRPr sz="1800" b="1"/>
+            <a:lvl3pPr marL="914411" indent="0">
+              <a:buNone/>
+              <a:defRPr sz="1801" b="1"/>
             </a:lvl3pPr>
-            <a:lvl4pPr marL="1371600" indent="0">
+            <a:lvl4pPr marL="1371617" indent="0">
               <a:buNone/>
               <a:defRPr sz="1600" b="1"/>
             </a:lvl4pPr>
-            <a:lvl5pPr marL="1828800" indent="0">
+            <a:lvl5pPr marL="1828823" indent="0">
               <a:buNone/>
               <a:defRPr sz="1600" b="1"/>
             </a:lvl5pPr>
-            <a:lvl6pPr marL="2286000" indent="0">
+            <a:lvl6pPr marL="2286029" indent="0">
               <a:buNone/>
               <a:defRPr sz="1600" b="1"/>
             </a:lvl6pPr>
-            <a:lvl7pPr marL="2743200" indent="0">
+            <a:lvl7pPr marL="2743234" indent="0">
               <a:buNone/>
               <a:defRPr sz="1600" b="1"/>
             </a:lvl7pPr>
-            <a:lvl8pPr marL="3200400" indent="0">
+            <a:lvl8pPr marL="3200440" indent="0">
               <a:buNone/>
               <a:defRPr sz="1600" b="1"/>
             </a:lvl8pPr>
-            <a:lvl9pPr marL="3657600" indent="0">
+            <a:lvl9pPr marL="3657646" indent="0">
               <a:buNone/>
               <a:defRPr sz="1600" b="1"/>
             </a:lvl9pPr>
@@ -1546,7 +1547,7 @@
         </p:nvSpPr>
         <p:spPr>
           <a:xfrm>
-            <a:off x="6172200" y="2505075"/>
+            <a:off x="6172202" y="2505076"/>
             <a:ext cx="5183188" cy="3684588"/>
           </a:xfrm>
         </p:spPr>
@@ -1911,8 +1912,8 @@
         </p:nvSpPr>
         <p:spPr>
           <a:xfrm>
-            <a:off x="839788" y="457200"/>
-            <a:ext cx="3932237" cy="1600200"/>
+            <a:off x="839790" y="457200"/>
+            <a:ext cx="3932236" cy="1600200"/>
           </a:xfrm>
         </p:spPr>
         <p:txBody>
@@ -1944,7 +1945,7 @@
         <p:spPr>
           <a:xfrm>
             <a:off x="5183188" y="987425"/>
-            <a:ext cx="6172200" cy="4873625"/>
+            <a:ext cx="6172201" cy="4873625"/>
           </a:xfrm>
         </p:spPr>
         <p:txBody>
@@ -2028,8 +2029,8 @@
         </p:nvSpPr>
         <p:spPr>
           <a:xfrm>
-            <a:off x="839788" y="2057400"/>
-            <a:ext cx="3932237" cy="3811588"/>
+            <a:off x="839790" y="2057400"/>
+            <a:ext cx="3932236" cy="3811588"/>
           </a:xfrm>
         </p:spPr>
         <p:txBody>
@@ -2039,37 +2040,37 @@
               <a:buNone/>
               <a:defRPr sz="1600"/>
             </a:lvl1pPr>
-            <a:lvl2pPr marL="457200" indent="0">
-              <a:buNone/>
-              <a:defRPr sz="1400"/>
+            <a:lvl2pPr marL="457206" indent="0">
+              <a:buNone/>
+              <a:defRPr sz="1401"/>
             </a:lvl2pPr>
-            <a:lvl3pPr marL="914400" indent="0">
+            <a:lvl3pPr marL="914411" indent="0">
               <a:buNone/>
               <a:defRPr sz="1200"/>
             </a:lvl3pPr>
-            <a:lvl4pPr marL="1371600" indent="0">
-              <a:buNone/>
-              <a:defRPr sz="1000"/>
+            <a:lvl4pPr marL="1371617" indent="0">
+              <a:buNone/>
+              <a:defRPr sz="1001"/>
             </a:lvl4pPr>
-            <a:lvl5pPr marL="1828800" indent="0">
-              <a:buNone/>
-              <a:defRPr sz="1000"/>
+            <a:lvl5pPr marL="1828823" indent="0">
+              <a:buNone/>
+              <a:defRPr sz="1001"/>
             </a:lvl5pPr>
-            <a:lvl6pPr marL="2286000" indent="0">
-              <a:buNone/>
-              <a:defRPr sz="1000"/>
+            <a:lvl6pPr marL="2286029" indent="0">
+              <a:buNone/>
+              <a:defRPr sz="1001"/>
             </a:lvl6pPr>
-            <a:lvl7pPr marL="2743200" indent="0">
-              <a:buNone/>
-              <a:defRPr sz="1000"/>
+            <a:lvl7pPr marL="2743234" indent="0">
+              <a:buNone/>
+              <a:defRPr sz="1001"/>
             </a:lvl7pPr>
-            <a:lvl8pPr marL="3200400" indent="0">
-              <a:buNone/>
-              <a:defRPr sz="1000"/>
+            <a:lvl8pPr marL="3200440" indent="0">
+              <a:buNone/>
+              <a:defRPr sz="1001"/>
             </a:lvl8pPr>
-            <a:lvl9pPr marL="3657600" indent="0">
-              <a:buNone/>
-              <a:defRPr sz="1000"/>
+            <a:lvl9pPr marL="3657646" indent="0">
+              <a:buNone/>
+              <a:defRPr sz="1001"/>
             </a:lvl9pPr>
           </a:lstStyle>
           <a:p>
@@ -2188,8 +2189,8 @@
         </p:nvSpPr>
         <p:spPr>
           <a:xfrm>
-            <a:off x="839788" y="457200"/>
-            <a:ext cx="3932237" cy="1600200"/>
+            <a:off x="839790" y="457200"/>
+            <a:ext cx="3932236" cy="1600200"/>
           </a:xfrm>
         </p:spPr>
         <p:txBody>
@@ -2221,7 +2222,7 @@
         <p:spPr>
           <a:xfrm>
             <a:off x="5183188" y="987425"/>
-            <a:ext cx="6172200" cy="4873625"/>
+            <a:ext cx="6172201" cy="4873625"/>
           </a:xfrm>
         </p:spPr>
         <p:txBody>
@@ -2231,35 +2232,35 @@
               <a:buNone/>
               <a:defRPr sz="3200"/>
             </a:lvl1pPr>
-            <a:lvl2pPr marL="457200" indent="0">
+            <a:lvl2pPr marL="457206" indent="0">
               <a:buNone/>
               <a:defRPr sz="2800"/>
             </a:lvl2pPr>
-            <a:lvl3pPr marL="914400" indent="0">
+            <a:lvl3pPr marL="914411" indent="0">
               <a:buNone/>
               <a:defRPr sz="2400"/>
             </a:lvl3pPr>
-            <a:lvl4pPr marL="1371600" indent="0">
+            <a:lvl4pPr marL="1371617" indent="0">
               <a:buNone/>
               <a:defRPr sz="2000"/>
             </a:lvl4pPr>
-            <a:lvl5pPr marL="1828800" indent="0">
+            <a:lvl5pPr marL="1828823" indent="0">
               <a:buNone/>
               <a:defRPr sz="2000"/>
             </a:lvl5pPr>
-            <a:lvl6pPr marL="2286000" indent="0">
+            <a:lvl6pPr marL="2286029" indent="0">
               <a:buNone/>
               <a:defRPr sz="2000"/>
             </a:lvl6pPr>
-            <a:lvl7pPr marL="2743200" indent="0">
+            <a:lvl7pPr marL="2743234" indent="0">
               <a:buNone/>
               <a:defRPr sz="2000"/>
             </a:lvl7pPr>
-            <a:lvl8pPr marL="3200400" indent="0">
+            <a:lvl8pPr marL="3200440" indent="0">
               <a:buNone/>
               <a:defRPr sz="2000"/>
             </a:lvl8pPr>
-            <a:lvl9pPr marL="3657600" indent="0">
+            <a:lvl9pPr marL="3657646" indent="0">
               <a:buNone/>
               <a:defRPr sz="2000"/>
             </a:lvl9pPr>
@@ -2285,8 +2286,8 @@
         </p:nvSpPr>
         <p:spPr>
           <a:xfrm>
-            <a:off x="839788" y="2057400"/>
-            <a:ext cx="3932237" cy="3811588"/>
+            <a:off x="839790" y="2057400"/>
+            <a:ext cx="3932236" cy="3811588"/>
           </a:xfrm>
         </p:spPr>
         <p:txBody>
@@ -2296,37 +2297,37 @@
               <a:buNone/>
               <a:defRPr sz="1600"/>
             </a:lvl1pPr>
-            <a:lvl2pPr marL="457200" indent="0">
-              <a:buNone/>
-              <a:defRPr sz="1400"/>
+            <a:lvl2pPr marL="457206" indent="0">
+              <a:buNone/>
+              <a:defRPr sz="1401"/>
             </a:lvl2pPr>
-            <a:lvl3pPr marL="914400" indent="0">
+            <a:lvl3pPr marL="914411" indent="0">
               <a:buNone/>
               <a:defRPr sz="1200"/>
             </a:lvl3pPr>
-            <a:lvl4pPr marL="1371600" indent="0">
-              <a:buNone/>
-              <a:defRPr sz="1000"/>
+            <a:lvl4pPr marL="1371617" indent="0">
+              <a:buNone/>
+              <a:defRPr sz="1001"/>
             </a:lvl4pPr>
-            <a:lvl5pPr marL="1828800" indent="0">
-              <a:buNone/>
-              <a:defRPr sz="1000"/>
+            <a:lvl5pPr marL="1828823" indent="0">
+              <a:buNone/>
+              <a:defRPr sz="1001"/>
             </a:lvl5pPr>
-            <a:lvl6pPr marL="2286000" indent="0">
-              <a:buNone/>
-              <a:defRPr sz="1000"/>
+            <a:lvl6pPr marL="2286029" indent="0">
+              <a:buNone/>
+              <a:defRPr sz="1001"/>
             </a:lvl6pPr>
-            <a:lvl7pPr marL="2743200" indent="0">
-              <a:buNone/>
-              <a:defRPr sz="1000"/>
+            <a:lvl7pPr marL="2743234" indent="0">
+              <a:buNone/>
+              <a:defRPr sz="1001"/>
             </a:lvl7pPr>
-            <a:lvl8pPr marL="3200400" indent="0">
-              <a:buNone/>
-              <a:defRPr sz="1000"/>
+            <a:lvl8pPr marL="3200440" indent="0">
+              <a:buNone/>
+              <a:defRPr sz="1001"/>
             </a:lvl8pPr>
-            <a:lvl9pPr marL="3657600" indent="0">
-              <a:buNone/>
-              <a:defRPr sz="1000"/>
+            <a:lvl9pPr marL="3657646" indent="0">
+              <a:buNone/>
+              <a:defRPr sz="1001"/>
             </a:lvl9pPr>
           </a:lstStyle>
           <a:p>
@@ -2450,7 +2451,7 @@
         </p:nvSpPr>
         <p:spPr>
           <a:xfrm>
-            <a:off x="838200" y="365125"/>
+            <a:off x="838202" y="365125"/>
             <a:ext cx="10515600" cy="1325563"/>
           </a:xfrm>
           <a:prstGeom prst="rect">
@@ -2483,7 +2484,7 @@
         </p:nvSpPr>
         <p:spPr>
           <a:xfrm>
-            <a:off x="838200" y="1825625"/>
+            <a:off x="838202" y="1825625"/>
             <a:ext cx="10515600" cy="4351338"/>
           </a:xfrm>
           <a:prstGeom prst="rect">
@@ -2545,7 +2546,7 @@
         </p:nvSpPr>
         <p:spPr>
           <a:xfrm>
-            <a:off x="838200" y="6356350"/>
+            <a:off x="838201" y="6356351"/>
             <a:ext cx="2743200" cy="365125"/>
           </a:xfrm>
           <a:prstGeom prst="rect">
@@ -2586,7 +2587,7 @@
         </p:nvSpPr>
         <p:spPr>
           <a:xfrm>
-            <a:off x="4038600" y="6356350"/>
+            <a:off x="4038602" y="6356351"/>
             <a:ext cx="4114800" cy="365125"/>
           </a:xfrm>
           <a:prstGeom prst="rect">
@@ -2623,7 +2624,7 @@
         </p:nvSpPr>
         <p:spPr>
           <a:xfrm>
-            <a:off x="8610600" y="6356350"/>
+            <a:off x="8610601" y="6356351"/>
             <a:ext cx="2743200" cy="365125"/>
           </a:xfrm>
           <a:prstGeom prst="rect">
@@ -2675,7 +2676,7 @@
   </p:sldLayoutIdLst>
   <p:txStyles>
     <p:titleStyle>
-      <a:lvl1pPr algn="l" defTabSz="914400" rtl="0" eaLnBrk="1" latinLnBrk="0" hangingPunct="1">
+      <a:lvl1pPr algn="l" defTabSz="914411" rtl="0" eaLnBrk="1" latinLnBrk="0" hangingPunct="1">
         <a:lnSpc>
           <a:spcPct val="90000"/>
         </a:lnSpc>
@@ -2694,12 +2695,12 @@
       </a:lvl1pPr>
     </p:titleStyle>
     <p:bodyStyle>
-      <a:lvl1pPr marL="228600" indent="-228600" algn="l" defTabSz="914400" rtl="0" eaLnBrk="1" latinLnBrk="0" hangingPunct="1">
+      <a:lvl1pPr marL="228604" indent="-228604" algn="l" defTabSz="914411" rtl="0" eaLnBrk="1" latinLnBrk="0" hangingPunct="1">
         <a:lnSpc>
           <a:spcPct val="90000"/>
         </a:lnSpc>
         <a:spcBef>
-          <a:spcPts val="1000"/>
+          <a:spcPts val="1001"/>
         </a:spcBef>
         <a:buFont typeface="Arial" panose="020B0604020202020204" pitchFamily="34" charset="0"/>
         <a:buChar char="•"/>
@@ -2712,7 +2713,7 @@
           <a:cs typeface="+mn-cs"/>
         </a:defRPr>
       </a:lvl1pPr>
-      <a:lvl2pPr marL="685800" indent="-228600" algn="l" defTabSz="914400" rtl="0" eaLnBrk="1" latinLnBrk="0" hangingPunct="1">
+      <a:lvl2pPr marL="685809" indent="-228604" algn="l" defTabSz="914411" rtl="0" eaLnBrk="1" latinLnBrk="0" hangingPunct="1">
         <a:lnSpc>
           <a:spcPct val="90000"/>
         </a:lnSpc>
@@ -2730,7 +2731,7 @@
           <a:cs typeface="+mn-cs"/>
         </a:defRPr>
       </a:lvl2pPr>
-      <a:lvl3pPr marL="1143000" indent="-228600" algn="l" defTabSz="914400" rtl="0" eaLnBrk="1" latinLnBrk="0" hangingPunct="1">
+      <a:lvl3pPr marL="1143015" indent="-228604" algn="l" defTabSz="914411" rtl="0" eaLnBrk="1" latinLnBrk="0" hangingPunct="1">
         <a:lnSpc>
           <a:spcPct val="90000"/>
         </a:lnSpc>
@@ -2748,7 +2749,7 @@
           <a:cs typeface="+mn-cs"/>
         </a:defRPr>
       </a:lvl3pPr>
-      <a:lvl4pPr marL="1600200" indent="-228600" algn="l" defTabSz="914400" rtl="0" eaLnBrk="1" latinLnBrk="0" hangingPunct="1">
+      <a:lvl4pPr marL="1600221" indent="-228604" algn="l" defTabSz="914411" rtl="0" eaLnBrk="1" latinLnBrk="0" hangingPunct="1">
         <a:lnSpc>
           <a:spcPct val="90000"/>
         </a:lnSpc>
@@ -2757,7 +2758,7 @@
         </a:spcBef>
         <a:buFont typeface="Arial" panose="020B0604020202020204" pitchFamily="34" charset="0"/>
         <a:buChar char="•"/>
-        <a:defRPr sz="1800" kern="1200">
+        <a:defRPr sz="1801" kern="1200">
           <a:solidFill>
             <a:schemeClr val="tx1"/>
           </a:solidFill>
@@ -2766,7 +2767,7 @@
           <a:cs typeface="+mn-cs"/>
         </a:defRPr>
       </a:lvl4pPr>
-      <a:lvl5pPr marL="2057400" indent="-228600" algn="l" defTabSz="914400" rtl="0" eaLnBrk="1" latinLnBrk="0" hangingPunct="1">
+      <a:lvl5pPr marL="2057427" indent="-228604" algn="l" defTabSz="914411" rtl="0" eaLnBrk="1" latinLnBrk="0" hangingPunct="1">
         <a:lnSpc>
           <a:spcPct val="90000"/>
         </a:lnSpc>
@@ -2775,7 +2776,7 @@
         </a:spcBef>
         <a:buFont typeface="Arial" panose="020B0604020202020204" pitchFamily="34" charset="0"/>
         <a:buChar char="•"/>
-        <a:defRPr sz="1800" kern="1200">
+        <a:defRPr sz="1801" kern="1200">
           <a:solidFill>
             <a:schemeClr val="tx1"/>
           </a:solidFill>
@@ -2784,7 +2785,7 @@
           <a:cs typeface="+mn-cs"/>
         </a:defRPr>
       </a:lvl5pPr>
-      <a:lvl6pPr marL="2514600" indent="-228600" algn="l" defTabSz="914400" rtl="0" eaLnBrk="1" latinLnBrk="0" hangingPunct="1">
+      <a:lvl6pPr marL="2514632" indent="-228604" algn="l" defTabSz="914411" rtl="0" eaLnBrk="1" latinLnBrk="0" hangingPunct="1">
         <a:lnSpc>
           <a:spcPct val="90000"/>
         </a:lnSpc>
@@ -2793,7 +2794,7 @@
         </a:spcBef>
         <a:buFont typeface="Arial" panose="020B0604020202020204" pitchFamily="34" charset="0"/>
         <a:buChar char="•"/>
-        <a:defRPr sz="1800" kern="1200">
+        <a:defRPr sz="1801" kern="1200">
           <a:solidFill>
             <a:schemeClr val="tx1"/>
           </a:solidFill>
@@ -2802,7 +2803,7 @@
           <a:cs typeface="+mn-cs"/>
         </a:defRPr>
       </a:lvl6pPr>
-      <a:lvl7pPr marL="2971800" indent="-228600" algn="l" defTabSz="914400" rtl="0" eaLnBrk="1" latinLnBrk="0" hangingPunct="1">
+      <a:lvl7pPr marL="2971838" indent="-228604" algn="l" defTabSz="914411" rtl="0" eaLnBrk="1" latinLnBrk="0" hangingPunct="1">
         <a:lnSpc>
           <a:spcPct val="90000"/>
         </a:lnSpc>
@@ -2811,7 +2812,7 @@
         </a:spcBef>
         <a:buFont typeface="Arial" panose="020B0604020202020204" pitchFamily="34" charset="0"/>
         <a:buChar char="•"/>
-        <a:defRPr sz="1800" kern="1200">
+        <a:defRPr sz="1801" kern="1200">
           <a:solidFill>
             <a:schemeClr val="tx1"/>
           </a:solidFill>
@@ -2820,7 +2821,7 @@
           <a:cs typeface="+mn-cs"/>
         </a:defRPr>
       </a:lvl7pPr>
-      <a:lvl8pPr marL="3429000" indent="-228600" algn="l" defTabSz="914400" rtl="0" eaLnBrk="1" latinLnBrk="0" hangingPunct="1">
+      <a:lvl8pPr marL="3429044" indent="-228604" algn="l" defTabSz="914411" rtl="0" eaLnBrk="1" latinLnBrk="0" hangingPunct="1">
         <a:lnSpc>
           <a:spcPct val="90000"/>
         </a:lnSpc>
@@ -2829,7 +2830,7 @@
         </a:spcBef>
         <a:buFont typeface="Arial" panose="020B0604020202020204" pitchFamily="34" charset="0"/>
         <a:buChar char="•"/>
-        <a:defRPr sz="1800" kern="1200">
+        <a:defRPr sz="1801" kern="1200">
           <a:solidFill>
             <a:schemeClr val="tx1"/>
           </a:solidFill>
@@ -2838,7 +2839,7 @@
           <a:cs typeface="+mn-cs"/>
         </a:defRPr>
       </a:lvl8pPr>
-      <a:lvl9pPr marL="3886200" indent="-228600" algn="l" defTabSz="914400" rtl="0" eaLnBrk="1" latinLnBrk="0" hangingPunct="1">
+      <a:lvl9pPr marL="3886249" indent="-228604" algn="l" defTabSz="914411" rtl="0" eaLnBrk="1" latinLnBrk="0" hangingPunct="1">
         <a:lnSpc>
           <a:spcPct val="90000"/>
         </a:lnSpc>
@@ -2847,7 +2848,7 @@
         </a:spcBef>
         <a:buFont typeface="Arial" panose="020B0604020202020204" pitchFamily="34" charset="0"/>
         <a:buChar char="•"/>
-        <a:defRPr sz="1800" kern="1200">
+        <a:defRPr sz="1801" kern="1200">
           <a:solidFill>
             <a:schemeClr val="tx1"/>
           </a:solidFill>
@@ -2861,8 +2862,8 @@
       <a:defPPr>
         <a:defRPr lang="en-US"/>
       </a:defPPr>
-      <a:lvl1pPr marL="0" algn="l" defTabSz="914400" rtl="0" eaLnBrk="1" latinLnBrk="0" hangingPunct="1">
-        <a:defRPr sz="1800" kern="1200">
+      <a:lvl1pPr marL="0" algn="l" defTabSz="914411" rtl="0" eaLnBrk="1" latinLnBrk="0" hangingPunct="1">
+        <a:defRPr sz="1801" kern="1200">
           <a:solidFill>
             <a:schemeClr val="tx1"/>
           </a:solidFill>
@@ -2871,8 +2872,8 @@
           <a:cs typeface="+mn-cs"/>
         </a:defRPr>
       </a:lvl1pPr>
-      <a:lvl2pPr marL="457200" algn="l" defTabSz="914400" rtl="0" eaLnBrk="1" latinLnBrk="0" hangingPunct="1">
-        <a:defRPr sz="1800" kern="1200">
+      <a:lvl2pPr marL="457206" algn="l" defTabSz="914411" rtl="0" eaLnBrk="1" latinLnBrk="0" hangingPunct="1">
+        <a:defRPr sz="1801" kern="1200">
           <a:solidFill>
             <a:schemeClr val="tx1"/>
           </a:solidFill>
@@ -2881,8 +2882,8 @@
           <a:cs typeface="+mn-cs"/>
         </a:defRPr>
       </a:lvl2pPr>
-      <a:lvl3pPr marL="914400" algn="l" defTabSz="914400" rtl="0" eaLnBrk="1" latinLnBrk="0" hangingPunct="1">
-        <a:defRPr sz="1800" kern="1200">
+      <a:lvl3pPr marL="914411" algn="l" defTabSz="914411" rtl="0" eaLnBrk="1" latinLnBrk="0" hangingPunct="1">
+        <a:defRPr sz="1801" kern="1200">
           <a:solidFill>
             <a:schemeClr val="tx1"/>
           </a:solidFill>
@@ -2891,8 +2892,8 @@
           <a:cs typeface="+mn-cs"/>
         </a:defRPr>
       </a:lvl3pPr>
-      <a:lvl4pPr marL="1371600" algn="l" defTabSz="914400" rtl="0" eaLnBrk="1" latinLnBrk="0" hangingPunct="1">
-        <a:defRPr sz="1800" kern="1200">
+      <a:lvl4pPr marL="1371617" algn="l" defTabSz="914411" rtl="0" eaLnBrk="1" latinLnBrk="0" hangingPunct="1">
+        <a:defRPr sz="1801" kern="1200">
           <a:solidFill>
             <a:schemeClr val="tx1"/>
           </a:solidFill>
@@ -2901,8 +2902,8 @@
           <a:cs typeface="+mn-cs"/>
         </a:defRPr>
       </a:lvl4pPr>
-      <a:lvl5pPr marL="1828800" algn="l" defTabSz="914400" rtl="0" eaLnBrk="1" latinLnBrk="0" hangingPunct="1">
-        <a:defRPr sz="1800" kern="1200">
+      <a:lvl5pPr marL="1828823" algn="l" defTabSz="914411" rtl="0" eaLnBrk="1" latinLnBrk="0" hangingPunct="1">
+        <a:defRPr sz="1801" kern="1200">
           <a:solidFill>
             <a:schemeClr val="tx1"/>
           </a:solidFill>
@@ -2911,8 +2912,8 @@
           <a:cs typeface="+mn-cs"/>
         </a:defRPr>
       </a:lvl5pPr>
-      <a:lvl6pPr marL="2286000" algn="l" defTabSz="914400" rtl="0" eaLnBrk="1" latinLnBrk="0" hangingPunct="1">
-        <a:defRPr sz="1800" kern="1200">
+      <a:lvl6pPr marL="2286029" algn="l" defTabSz="914411" rtl="0" eaLnBrk="1" latinLnBrk="0" hangingPunct="1">
+        <a:defRPr sz="1801" kern="1200">
           <a:solidFill>
             <a:schemeClr val="tx1"/>
           </a:solidFill>
@@ -2921,8 +2922,8 @@
           <a:cs typeface="+mn-cs"/>
         </a:defRPr>
       </a:lvl6pPr>
-      <a:lvl7pPr marL="2743200" algn="l" defTabSz="914400" rtl="0" eaLnBrk="1" latinLnBrk="0" hangingPunct="1">
-        <a:defRPr sz="1800" kern="1200">
+      <a:lvl7pPr marL="2743234" algn="l" defTabSz="914411" rtl="0" eaLnBrk="1" latinLnBrk="0" hangingPunct="1">
+        <a:defRPr sz="1801" kern="1200">
           <a:solidFill>
             <a:schemeClr val="tx1"/>
           </a:solidFill>
@@ -2931,8 +2932,8 @@
           <a:cs typeface="+mn-cs"/>
         </a:defRPr>
       </a:lvl7pPr>
-      <a:lvl8pPr marL="3200400" algn="l" defTabSz="914400" rtl="0" eaLnBrk="1" latinLnBrk="0" hangingPunct="1">
-        <a:defRPr sz="1800" kern="1200">
+      <a:lvl8pPr marL="3200440" algn="l" defTabSz="914411" rtl="0" eaLnBrk="1" latinLnBrk="0" hangingPunct="1">
+        <a:defRPr sz="1801" kern="1200">
           <a:solidFill>
             <a:schemeClr val="tx1"/>
           </a:solidFill>
@@ -2941,8 +2942,8 @@
           <a:cs typeface="+mn-cs"/>
         </a:defRPr>
       </a:lvl8pPr>
-      <a:lvl9pPr marL="3657600" algn="l" defTabSz="914400" rtl="0" eaLnBrk="1" latinLnBrk="0" hangingPunct="1">
-        <a:defRPr sz="1800" kern="1200">
+      <a:lvl9pPr marL="3657646" algn="l" defTabSz="914411" rtl="0" eaLnBrk="1" latinLnBrk="0" hangingPunct="1">
+        <a:defRPr sz="1801" kern="1200">
           <a:solidFill>
             <a:schemeClr val="tx1"/>
           </a:solidFill>
@@ -3001,7 +3002,7 @@
         </p:blipFill>
         <p:spPr>
           <a:xfrm>
-            <a:off x="2667000" y="0"/>
+            <a:off x="2667002" y="2"/>
             <a:ext cx="6858000" cy="6858000"/>
           </a:xfrm>
           <a:prstGeom prst="rect">
@@ -3030,8 +3031,8 @@
           </p:nvPr>
         </p:nvGraphicFramePr>
         <p:xfrm>
-          <a:off x="2866306" y="5959111"/>
-          <a:ext cx="4480724" cy="731520"/>
+          <a:off x="2866306" y="5959110"/>
+          <a:ext cx="4480724" cy="640082"/>
         </p:xfrm>
         <a:graphic>
           <a:graphicData uri="http://schemas.openxmlformats.org/drawingml/2006/table">
@@ -3062,16 +3063,16 @@
                   </a:extLst>
                 </a:gridCol>
               </a:tblGrid>
-              <a:tr h="320040">
+              <a:tr h="320041">
                 <a:tc gridSpan="3">
                   <a:txBody>
                     <a:bodyPr/>
                     <a:lstStyle/>
                     <a:p>
-                      <a:endParaRPr lang="en-US" dirty="0"/>
+                      <a:endParaRPr lang="en-US" sz="1100" dirty="0"/>
                     </a:p>
                   </a:txBody>
-                  <a:tcPr>
+                  <a:tcPr marT="45721" marB="45721">
                     <a:lnL w="12700" cap="flat" cmpd="sng" algn="ctr">
                       <a:solidFill>
                         <a:schemeClr val="tx1"/>
@@ -3139,19 +3140,19 @@
                   </a:ext>
                 </a:extLst>
               </a:tr>
-              <a:tr h="320040">
+              <a:tr h="320041">
                 <a:tc>
                   <a:txBody>
                     <a:bodyPr/>
                     <a:lstStyle/>
                     <a:p>
                       <a:r>
-                        <a:rPr lang="en-US" dirty="0"/>
+                        <a:rPr lang="en-US" sz="1100" dirty="0"/>
                         <a:t>0%</a:t>
                       </a:r>
                     </a:p>
                   </a:txBody>
-                  <a:tcPr>
+                  <a:tcPr marT="45721" marB="45721">
                     <a:lnL w="12700" cap="flat" cmpd="sng" algn="ctr">
                       <a:solidFill>
                         <a:schemeClr val="tx1"/>
@@ -3182,12 +3183,12 @@
                     <a:p>
                       <a:pPr algn="ctr"/>
                       <a:r>
-                        <a:rPr lang="en-US" dirty="0"/>
+                        <a:rPr lang="en-US" sz="1100" dirty="0"/>
                         <a:t>Polar Contact Prevalence</a:t>
                       </a:r>
                     </a:p>
                   </a:txBody>
-                  <a:tcPr>
+                  <a:tcPr marT="45721" marB="45721">
                     <a:lnB w="12700" cap="flat" cmpd="sng" algn="ctr">
                       <a:solidFill>
                         <a:schemeClr val="tx1"/>
@@ -3209,12 +3210,12 @@
                     <a:p>
                       <a:pPr algn="r"/>
                       <a:r>
-                        <a:rPr lang="en-US" dirty="0"/>
+                        <a:rPr lang="en-US" sz="1100" dirty="0"/>
                         <a:t>26%</a:t>
                       </a:r>
                     </a:p>
                   </a:txBody>
-                  <a:tcPr>
+                  <a:tcPr marT="45721" marB="45721">
                     <a:lnR w="12700" cap="flat" cmpd="sng" algn="ctr">
                       <a:solidFill>
                         <a:schemeClr val="tx1"/>
@@ -3292,8 +3293,8 @@
         </p:nvSpPr>
         <p:spPr>
           <a:xfrm>
-            <a:off x="5161577" y="4291672"/>
-            <a:ext cx="934423" cy="307025"/>
+            <a:off x="5161578" y="4291672"/>
+            <a:ext cx="934423" cy="307026"/>
           </a:xfrm>
           <a:prstGeom prst="roundRect">
             <a:avLst>
@@ -3331,7 +3332,7 @@
           <a:p>
             <a:pPr algn="ctr"/>
             <a:r>
-              <a:rPr lang="en-US" dirty="0"/>
+              <a:rPr lang="en-US" sz="1801" dirty="0"/>
               <a:t>R149</a:t>
             </a:r>
           </a:p>
@@ -3351,8 +3352,8 @@
         </p:nvSpPr>
         <p:spPr>
           <a:xfrm>
-            <a:off x="3533876" y="2713374"/>
-            <a:ext cx="934423" cy="307025"/>
+            <a:off x="3533878" y="2713373"/>
+            <a:ext cx="934423" cy="307026"/>
           </a:xfrm>
           <a:prstGeom prst="roundRect">
             <a:avLst>
@@ -3390,7 +3391,7 @@
           <a:p>
             <a:pPr algn="ctr"/>
             <a:r>
-              <a:rPr lang="en-US" dirty="0"/>
+              <a:rPr lang="en-US" sz="1801" dirty="0"/>
               <a:t>K222</a:t>
             </a:r>
           </a:p>
@@ -3410,8 +3411,8 @@
         </p:nvSpPr>
         <p:spPr>
           <a:xfrm>
-            <a:off x="3230435" y="1336527"/>
-            <a:ext cx="934423" cy="307025"/>
+            <a:off x="3230437" y="1336527"/>
+            <a:ext cx="934423" cy="307026"/>
           </a:xfrm>
           <a:prstGeom prst="roundRect">
             <a:avLst>
@@ -3449,7 +3450,7 @@
           <a:p>
             <a:pPr algn="ctr"/>
             <a:r>
-              <a:rPr lang="en-US" dirty="0"/>
+              <a:rPr lang="en-US" sz="1801" dirty="0"/>
               <a:t>S193</a:t>
             </a:r>
           </a:p>
@@ -3469,8 +3470,8 @@
         </p:nvSpPr>
         <p:spPr>
           <a:xfrm>
-            <a:off x="5786598" y="694680"/>
-            <a:ext cx="934423" cy="307025"/>
+            <a:off x="5786600" y="694680"/>
+            <a:ext cx="934423" cy="307026"/>
           </a:xfrm>
           <a:prstGeom prst="roundRect">
             <a:avLst>
@@ -3508,7 +3509,7 @@
           <a:p>
             <a:pPr algn="ctr"/>
             <a:r>
-              <a:rPr lang="en-US" dirty="0"/>
+              <a:rPr lang="en-US" sz="1801" dirty="0"/>
               <a:t>G158</a:t>
             </a:r>
           </a:p>
@@ -3528,8 +3529,8 @@
         </p:nvSpPr>
         <p:spPr>
           <a:xfrm>
-            <a:off x="3884227" y="872293"/>
-            <a:ext cx="934423" cy="307025"/>
+            <a:off x="3884229" y="872292"/>
+            <a:ext cx="934423" cy="307026"/>
           </a:xfrm>
           <a:prstGeom prst="roundRect">
             <a:avLst>
@@ -3567,7 +3568,7 @@
           <a:p>
             <a:pPr algn="ctr"/>
             <a:r>
-              <a:rPr lang="en-US" dirty="0"/>
+              <a:rPr lang="en-US" sz="1801" dirty="0"/>
               <a:t>K156</a:t>
             </a:r>
           </a:p>
@@ -3587,8 +3588,8 @@
         </p:nvSpPr>
         <p:spPr>
           <a:xfrm>
-            <a:off x="5505159" y="326473"/>
-            <a:ext cx="934423" cy="307025"/>
+            <a:off x="5505160" y="326474"/>
+            <a:ext cx="934423" cy="307026"/>
           </a:xfrm>
           <a:prstGeom prst="roundRect">
             <a:avLst>
@@ -3626,7 +3627,7 @@
           <a:p>
             <a:pPr algn="ctr"/>
             <a:r>
-              <a:rPr lang="en-US" dirty="0"/>
+              <a:rPr lang="en-US" sz="1801" dirty="0"/>
               <a:t>S159</a:t>
             </a:r>
           </a:p>
@@ -3646,8 +3647,8 @@
         </p:nvSpPr>
         <p:spPr>
           <a:xfrm>
-            <a:off x="2666847" y="3510999"/>
-            <a:ext cx="934423" cy="307025"/>
+            <a:off x="2666849" y="3511000"/>
+            <a:ext cx="934423" cy="307026"/>
           </a:xfrm>
           <a:prstGeom prst="roundRect">
             <a:avLst>
@@ -3685,7 +3686,7 @@
           <a:p>
             <a:pPr algn="ctr"/>
             <a:r>
-              <a:rPr lang="en-US" dirty="0"/>
+              <a:rPr lang="en-US" sz="1801" dirty="0"/>
               <a:t>A137</a:t>
             </a:r>
           </a:p>
@@ -3705,8 +3706,8 @@
         </p:nvSpPr>
         <p:spPr>
           <a:xfrm>
-            <a:off x="6253809" y="2309072"/>
-            <a:ext cx="934423" cy="307025"/>
+            <a:off x="6253811" y="2309073"/>
+            <a:ext cx="934423" cy="307026"/>
           </a:xfrm>
           <a:prstGeom prst="roundRect">
             <a:avLst>
@@ -3744,7 +3745,7 @@
           <a:p>
             <a:pPr algn="ctr"/>
             <a:r>
-              <a:rPr lang="en-US" dirty="0"/>
+              <a:rPr lang="en-US" sz="1801" dirty="0"/>
               <a:t>T132</a:t>
             </a:r>
           </a:p>
@@ -3764,8 +3765,8 @@
         </p:nvSpPr>
         <p:spPr>
           <a:xfrm>
-            <a:off x="4408574" y="3768044"/>
-            <a:ext cx="934423" cy="307025"/>
+            <a:off x="4408575" y="3768043"/>
+            <a:ext cx="934423" cy="307026"/>
           </a:xfrm>
           <a:prstGeom prst="roundRect">
             <a:avLst>
@@ -3803,7 +3804,7 @@
           <a:p>
             <a:pPr algn="ctr"/>
             <a:r>
-              <a:rPr lang="en-US" dirty="0"/>
+              <a:rPr lang="en-US" sz="1801" dirty="0"/>
               <a:t>A144</a:t>
             </a:r>
           </a:p>
@@ -3823,8 +3824,8 @@
         </p:nvSpPr>
         <p:spPr>
           <a:xfrm>
-            <a:off x="6253809" y="1877837"/>
-            <a:ext cx="934423" cy="307025"/>
+            <a:off x="6253811" y="1877837"/>
+            <a:ext cx="934423" cy="307026"/>
           </a:xfrm>
           <a:prstGeom prst="roundRect">
             <a:avLst>
@@ -3862,7 +3863,7 @@
           <a:p>
             <a:pPr algn="ctr"/>
             <a:r>
-              <a:rPr lang="en-US" dirty="0"/>
+              <a:rPr lang="en-US" sz="1801" dirty="0"/>
               <a:t>H130</a:t>
             </a:r>
           </a:p>
@@ -3882,8 +3883,8 @@
         </p:nvSpPr>
         <p:spPr>
           <a:xfrm>
-            <a:off x="8211447" y="5652086"/>
-            <a:ext cx="934423" cy="307025"/>
+            <a:off x="8211448" y="5652086"/>
+            <a:ext cx="934423" cy="307026"/>
           </a:xfrm>
           <a:prstGeom prst="roundRect">
             <a:avLst>
@@ -3921,7 +3922,7 @@
           <a:p>
             <a:pPr algn="ctr"/>
             <a:r>
-              <a:rPr lang="en-US" dirty="0"/>
+              <a:rPr lang="en-US" sz="1801" dirty="0"/>
               <a:t>S117</a:t>
             </a:r>
           </a:p>
@@ -3931,6 +3932,479 @@
     <p:extLst>
       <p:ext uri="{BB962C8B-B14F-4D97-AF65-F5344CB8AC3E}">
         <p14:creationId xmlns:p14="http://schemas.microsoft.com/office/powerpoint/2010/main" val="3536656112"/>
+      </p:ext>
+    </p:extLst>
+  </p:cSld>
+  <p:clrMapOvr>
+    <a:masterClrMapping/>
+  </p:clrMapOvr>
+</p:sld>
+</file>
+
+<file path=ppt/slides/slide2.xml><?xml version="1.0" encoding="utf-8"?>
+<p:sld xmlns:a="http://schemas.openxmlformats.org/drawingml/2006/main" xmlns:r="http://schemas.openxmlformats.org/officeDocument/2006/relationships" xmlns:p="http://schemas.openxmlformats.org/presentationml/2006/main">
+  <p:cSld>
+    <p:spTree>
+      <p:nvGrpSpPr>
+        <p:cNvPr id="1" name=""/>
+        <p:cNvGrpSpPr/>
+        <p:nvPr/>
+      </p:nvGrpSpPr>
+      <p:grpSpPr>
+        <a:xfrm>
+          <a:off x="0" y="0"/>
+          <a:ext cx="0" cy="0"/>
+          <a:chOff x="0" y="0"/>
+          <a:chExt cx="0" cy="0"/>
+        </a:xfrm>
+      </p:grpSpPr>
+      <p:pic>
+        <p:nvPicPr>
+          <p:cNvPr id="4" name="Picture 3" descr="A green and red string&#10;&#10;Description automatically generated with medium confidence">
+            <a:extLst>
+              <a:ext uri="{FF2B5EF4-FFF2-40B4-BE49-F238E27FC236}">
+                <a16:creationId xmlns:a16="http://schemas.microsoft.com/office/drawing/2014/main" id="{389316C5-D6AC-AFFF-493C-39BE3E17A2DB}"/>
+              </a:ext>
+            </a:extLst>
+          </p:cNvPr>
+          <p:cNvPicPr>
+            <a:picLocks noChangeAspect="1"/>
+          </p:cNvPicPr>
+          <p:nvPr/>
+        </p:nvPicPr>
+        <p:blipFill>
+          <a:blip r:embed="rId2">
+            <a:extLst>
+              <a:ext uri="{28A0092B-C50C-407E-A947-70E740481C1C}">
+                <a14:useLocalDpi xmlns:a14="http://schemas.microsoft.com/office/drawing/2010/main" val="0"/>
+              </a:ext>
+            </a:extLst>
+          </a:blip>
+          <a:stretch>
+            <a:fillRect/>
+          </a:stretch>
+        </p:blipFill>
+        <p:spPr>
+          <a:xfrm>
+            <a:off x="-557247" y="1053163"/>
+            <a:ext cx="4572000" cy="4572000"/>
+          </a:xfrm>
+          <a:prstGeom prst="rect">
+            <a:avLst/>
+          </a:prstGeom>
+          <a:ln w="38100" cap="sq">
+            <a:solidFill>
+              <a:schemeClr val="tx1"/>
+            </a:solidFill>
+            <a:miter lim="800000"/>
+          </a:ln>
+        </p:spPr>
+      </p:pic>
+      <p:sp>
+        <p:nvSpPr>
+          <p:cNvPr id="5" name="Rectangle 4">
+            <a:extLst>
+              <a:ext uri="{FF2B5EF4-FFF2-40B4-BE49-F238E27FC236}">
+                <a16:creationId xmlns:a16="http://schemas.microsoft.com/office/drawing/2014/main" id="{2292289D-1CE5-2BDB-5AAE-D216BA36BEE1}"/>
+              </a:ext>
+            </a:extLst>
+          </p:cNvPr>
+          <p:cNvSpPr/>
+          <p:nvPr/>
+        </p:nvSpPr>
+        <p:spPr>
+          <a:xfrm>
+            <a:off x="-557247" y="1067347"/>
+            <a:ext cx="4572000" cy="296029"/>
+          </a:xfrm>
+          <a:prstGeom prst="rect">
+            <a:avLst/>
+          </a:prstGeom>
+          <a:solidFill>
+            <a:schemeClr val="tx1"/>
+          </a:solidFill>
+          <a:ln w="38100" cap="sq">
+            <a:solidFill>
+              <a:schemeClr val="tx1"/>
+            </a:solidFill>
+            <a:miter lim="800000"/>
+          </a:ln>
+        </p:spPr>
+        <p:style>
+          <a:lnRef idx="2">
+            <a:schemeClr val="accent1">
+              <a:shade val="15000"/>
+            </a:schemeClr>
+          </a:lnRef>
+          <a:fillRef idx="1">
+            <a:schemeClr val="accent1"/>
+          </a:fillRef>
+          <a:effectRef idx="0">
+            <a:schemeClr val="accent1"/>
+          </a:effectRef>
+          <a:fontRef idx="minor">
+            <a:schemeClr val="lt1"/>
+          </a:fontRef>
+        </p:style>
+        <p:txBody>
+          <a:bodyPr rtlCol="0" anchor="ctr"/>
+          <a:lstStyle/>
+          <a:p>
+            <a:pPr algn="ctr"/>
+            <a:r>
+              <a:rPr lang="en-US" dirty="0"/>
+              <a:t>AVFluIgG01 ◄► EPI168674</a:t>
+            </a:r>
+          </a:p>
+        </p:txBody>
+      </p:sp>
+      <p:pic>
+        <p:nvPicPr>
+          <p:cNvPr id="7" name="Picture 6" descr="A close-up of a structure&#10;&#10;Description automatically generated">
+            <a:extLst>
+              <a:ext uri="{FF2B5EF4-FFF2-40B4-BE49-F238E27FC236}">
+                <a16:creationId xmlns:a16="http://schemas.microsoft.com/office/drawing/2014/main" id="{5B0B7E5D-A10B-7B01-3DEA-E8EF2727D9CF}"/>
+              </a:ext>
+            </a:extLst>
+          </p:cNvPr>
+          <p:cNvPicPr>
+            <a:picLocks noChangeAspect="1"/>
+          </p:cNvPicPr>
+          <p:nvPr/>
+        </p:nvPicPr>
+        <p:blipFill>
+          <a:blip r:embed="rId3">
+            <a:extLst>
+              <a:ext uri="{28A0092B-C50C-407E-A947-70E740481C1C}">
+                <a14:useLocalDpi xmlns:a14="http://schemas.microsoft.com/office/drawing/2010/main" val="0"/>
+              </a:ext>
+            </a:extLst>
+          </a:blip>
+          <a:stretch>
+            <a:fillRect/>
+          </a:stretch>
+        </p:blipFill>
+        <p:spPr>
+          <a:xfrm>
+            <a:off x="4052683" y="1053163"/>
+            <a:ext cx="4572000" cy="4572000"/>
+          </a:xfrm>
+          <a:prstGeom prst="rect">
+            <a:avLst/>
+          </a:prstGeom>
+          <a:ln w="38100" cap="sq">
+            <a:solidFill>
+              <a:schemeClr val="tx1"/>
+            </a:solidFill>
+            <a:miter lim="800000"/>
+          </a:ln>
+        </p:spPr>
+      </p:pic>
+      <p:sp>
+        <p:nvSpPr>
+          <p:cNvPr id="8" name="Rectangle 7">
+            <a:extLst>
+              <a:ext uri="{FF2B5EF4-FFF2-40B4-BE49-F238E27FC236}">
+                <a16:creationId xmlns:a16="http://schemas.microsoft.com/office/drawing/2014/main" id="{01681B20-A97A-48BF-5206-DEB5FA4DDA24}"/>
+              </a:ext>
+            </a:extLst>
+          </p:cNvPr>
+          <p:cNvSpPr/>
+          <p:nvPr/>
+        </p:nvSpPr>
+        <p:spPr>
+          <a:xfrm>
+            <a:off x="4052683" y="1067347"/>
+            <a:ext cx="4572000" cy="296029"/>
+          </a:xfrm>
+          <a:prstGeom prst="rect">
+            <a:avLst/>
+          </a:prstGeom>
+          <a:solidFill>
+            <a:schemeClr val="tx1"/>
+          </a:solidFill>
+          <a:ln w="38100" cap="sq">
+            <a:solidFill>
+              <a:schemeClr val="tx1"/>
+            </a:solidFill>
+            <a:miter lim="800000"/>
+          </a:ln>
+        </p:spPr>
+        <p:style>
+          <a:lnRef idx="2">
+            <a:schemeClr val="accent1">
+              <a:shade val="15000"/>
+            </a:schemeClr>
+          </a:lnRef>
+          <a:fillRef idx="1">
+            <a:schemeClr val="accent1"/>
+          </a:fillRef>
+          <a:effectRef idx="0">
+            <a:schemeClr val="accent1"/>
+          </a:effectRef>
+          <a:fontRef idx="minor">
+            <a:schemeClr val="lt1"/>
+          </a:fontRef>
+        </p:style>
+        <p:txBody>
+          <a:bodyPr rtlCol="0" anchor="ctr"/>
+          <a:lstStyle/>
+          <a:p>
+            <a:pPr algn="ctr"/>
+            <a:r>
+              <a:rPr lang="en-US" dirty="0"/>
+              <a:t>100F4 ◄► EPI2429052</a:t>
+            </a:r>
+          </a:p>
+        </p:txBody>
+      </p:sp>
+      <p:pic>
+        <p:nvPicPr>
+          <p:cNvPr id="10" name="Picture 9" descr="A green and red plant&#10;&#10;Description automatically generated">
+            <a:extLst>
+              <a:ext uri="{FF2B5EF4-FFF2-40B4-BE49-F238E27FC236}">
+                <a16:creationId xmlns:a16="http://schemas.microsoft.com/office/drawing/2014/main" id="{F8362B7D-EF07-DBEF-6244-F08A832D3FAE}"/>
+              </a:ext>
+            </a:extLst>
+          </p:cNvPr>
+          <p:cNvPicPr>
+            <a:picLocks noChangeAspect="1"/>
+          </p:cNvPicPr>
+          <p:nvPr/>
+        </p:nvPicPr>
+        <p:blipFill>
+          <a:blip r:embed="rId4">
+            <a:extLst>
+              <a:ext uri="{28A0092B-C50C-407E-A947-70E740481C1C}">
+                <a14:useLocalDpi xmlns:a14="http://schemas.microsoft.com/office/drawing/2010/main" val="0"/>
+              </a:ext>
+            </a:extLst>
+          </a:blip>
+          <a:stretch>
+            <a:fillRect/>
+          </a:stretch>
+        </p:blipFill>
+        <p:spPr>
+          <a:xfrm>
+            <a:off x="8662613" y="1053163"/>
+            <a:ext cx="4572000" cy="4572000"/>
+          </a:xfrm>
+          <a:prstGeom prst="rect">
+            <a:avLst/>
+          </a:prstGeom>
+          <a:ln w="38100" cap="sq">
+            <a:solidFill>
+              <a:schemeClr val="tx1"/>
+            </a:solidFill>
+            <a:miter lim="800000"/>
+          </a:ln>
+        </p:spPr>
+      </p:pic>
+      <p:sp>
+        <p:nvSpPr>
+          <p:cNvPr id="11" name="Rectangle 10">
+            <a:extLst>
+              <a:ext uri="{FF2B5EF4-FFF2-40B4-BE49-F238E27FC236}">
+                <a16:creationId xmlns:a16="http://schemas.microsoft.com/office/drawing/2014/main" id="{1D9947C8-2503-B55A-38B6-2FACE553E8D3}"/>
+              </a:ext>
+            </a:extLst>
+          </p:cNvPr>
+          <p:cNvSpPr/>
+          <p:nvPr/>
+        </p:nvSpPr>
+        <p:spPr>
+          <a:xfrm>
+            <a:off x="8662613" y="1067347"/>
+            <a:ext cx="4572000" cy="296029"/>
+          </a:xfrm>
+          <a:prstGeom prst="rect">
+            <a:avLst/>
+          </a:prstGeom>
+          <a:solidFill>
+            <a:schemeClr val="tx1"/>
+          </a:solidFill>
+          <a:ln w="38100" cap="sq">
+            <a:solidFill>
+              <a:schemeClr val="tx1"/>
+            </a:solidFill>
+            <a:miter lim="800000"/>
+          </a:ln>
+        </p:spPr>
+        <p:style>
+          <a:lnRef idx="2">
+            <a:schemeClr val="accent1">
+              <a:shade val="15000"/>
+            </a:schemeClr>
+          </a:lnRef>
+          <a:fillRef idx="1">
+            <a:schemeClr val="accent1"/>
+          </a:fillRef>
+          <a:effectRef idx="0">
+            <a:schemeClr val="accent1"/>
+          </a:effectRef>
+          <a:fontRef idx="minor">
+            <a:schemeClr val="lt1"/>
+          </a:fontRef>
+        </p:style>
+        <p:txBody>
+          <a:bodyPr rtlCol="0" anchor="ctr"/>
+          <a:lstStyle/>
+          <a:p>
+            <a:pPr algn="ctr"/>
+            <a:r>
+              <a:rPr lang="en-US" dirty="0"/>
+              <a:t>13D4 ◄► EPI3358339</a:t>
+            </a:r>
+          </a:p>
+        </p:txBody>
+      </p:sp>
+      <p:sp>
+        <p:nvSpPr>
+          <p:cNvPr id="13" name="TextBox 12">
+            <a:extLst>
+              <a:ext uri="{FF2B5EF4-FFF2-40B4-BE49-F238E27FC236}">
+                <a16:creationId xmlns:a16="http://schemas.microsoft.com/office/drawing/2014/main" id="{371B2D92-7646-5450-B6C9-A1B8C50123E4}"/>
+              </a:ext>
+            </a:extLst>
+          </p:cNvPr>
+          <p:cNvSpPr txBox="1"/>
+          <p:nvPr/>
+        </p:nvSpPr>
+        <p:spPr>
+          <a:xfrm>
+            <a:off x="-557247" y="5643459"/>
+            <a:ext cx="4572000" cy="646331"/>
+          </a:xfrm>
+          <a:prstGeom prst="rect">
+            <a:avLst/>
+          </a:prstGeom>
+          <a:noFill/>
+        </p:spPr>
+        <p:txBody>
+          <a:bodyPr wrap="square" rtlCol="0">
+            <a:spAutoFit/>
+          </a:bodyPr>
+          <a:lstStyle/>
+          <a:p>
+            <a:pPr algn="ctr"/>
+            <a:r>
+              <a:rPr lang="en-US" dirty="0"/>
+              <a:t>K159, H189, D190, E191,</a:t>
+            </a:r>
+          </a:p>
+          <a:p>
+            <a:pPr algn="ctr"/>
+            <a:r>
+              <a:rPr lang="en-US" dirty="0"/>
+              <a:t>A192, K196, K225, S231</a:t>
+            </a:r>
+          </a:p>
+        </p:txBody>
+      </p:sp>
+      <p:sp>
+        <p:nvSpPr>
+          <p:cNvPr id="14" name="TextBox 13">
+            <a:extLst>
+              <a:ext uri="{FF2B5EF4-FFF2-40B4-BE49-F238E27FC236}">
+                <a16:creationId xmlns:a16="http://schemas.microsoft.com/office/drawing/2014/main" id="{C2CA8FA4-1AC7-2D5B-7D7A-A196CD750BE8}"/>
+              </a:ext>
+            </a:extLst>
+          </p:cNvPr>
+          <p:cNvSpPr txBox="1"/>
+          <p:nvPr/>
+        </p:nvSpPr>
+        <p:spPr>
+          <a:xfrm>
+            <a:off x="8662613" y="5639347"/>
+            <a:ext cx="4572000" cy="923330"/>
+          </a:xfrm>
+          <a:prstGeom prst="rect">
+            <a:avLst/>
+          </a:prstGeom>
+          <a:noFill/>
+        </p:spPr>
+        <p:txBody>
+          <a:bodyPr wrap="square" rtlCol="0">
+            <a:spAutoFit/>
+          </a:bodyPr>
+          <a:lstStyle/>
+          <a:p>
+            <a:pPr algn="ctr"/>
+            <a:r>
+              <a:rPr lang="en-US" dirty="0"/>
+              <a:t>D133, V136, S140, E147, S148,</a:t>
+            </a:r>
+          </a:p>
+          <a:p>
+            <a:pPr algn="ctr"/>
+            <a:r>
+              <a:rPr lang="en-US" dirty="0"/>
+              <a:t>N161, D162, D190, T192, R196,</a:t>
+            </a:r>
+          </a:p>
+          <a:p>
+            <a:pPr algn="ctr"/>
+            <a:r>
+              <a:rPr lang="en-US" dirty="0"/>
+              <a:t>Q225, G228, Q229, R230</a:t>
+            </a:r>
+          </a:p>
+        </p:txBody>
+      </p:sp>
+      <p:sp>
+        <p:nvSpPr>
+          <p:cNvPr id="15" name="TextBox 14">
+            <a:extLst>
+              <a:ext uri="{FF2B5EF4-FFF2-40B4-BE49-F238E27FC236}">
+                <a16:creationId xmlns:a16="http://schemas.microsoft.com/office/drawing/2014/main" id="{633426FE-952E-A6A9-70A4-EFEB912D1823}"/>
+              </a:ext>
+            </a:extLst>
+          </p:cNvPr>
+          <p:cNvSpPr txBox="1"/>
+          <p:nvPr/>
+        </p:nvSpPr>
+        <p:spPr>
+          <a:xfrm>
+            <a:off x="4052683" y="5643459"/>
+            <a:ext cx="4572000" cy="923330"/>
+          </a:xfrm>
+          <a:prstGeom prst="rect">
+            <a:avLst/>
+          </a:prstGeom>
+          <a:noFill/>
+        </p:spPr>
+        <p:txBody>
+          <a:bodyPr wrap="square" rtlCol="0">
+            <a:spAutoFit/>
+          </a:bodyPr>
+          <a:lstStyle/>
+          <a:p>
+            <a:pPr algn="ctr"/>
+            <a:r>
+              <a:rPr lang="en-US" dirty="0"/>
+              <a:t>R152, N153, Q214, K219,</a:t>
+            </a:r>
+          </a:p>
+          <a:p>
+            <a:pPr algn="ctr"/>
+            <a:r>
+              <a:rPr lang="en-US" dirty="0"/>
+              <a:t>R223, S224, Q225, N227,</a:t>
+            </a:r>
+          </a:p>
+          <a:p>
+            <a:pPr algn="ctr"/>
+            <a:r>
+              <a:rPr lang="en-US" dirty="0"/>
+              <a:t>M233, D234, F235, W237</a:t>
+            </a:r>
+          </a:p>
+        </p:txBody>
+      </p:sp>
+    </p:spTree>
+    <p:extLst>
+      <p:ext uri="{BB962C8B-B14F-4D97-AF65-F5344CB8AC3E}">
+        <p14:creationId xmlns:p14="http://schemas.microsoft.com/office/powerpoint/2010/main" val="3855827971"/>
       </p:ext>
     </p:extLst>
   </p:cSld>

</xml_diff>

<commit_message>
Add PDB 2fk0 figures
</commit_message>
<xml_diff>
--- a/figures/structures/protein_structure_figures.pptx
+++ b/figures/structures/protein_structure_figures.pptx
@@ -6,7 +6,8 @@
   </p:sldMasterIdLst>
   <p:sldIdLst>
     <p:sldId id="256" r:id="rId2"/>
-    <p:sldId id="257" r:id="rId3"/>
+    <p:sldId id="258" r:id="rId3"/>
+    <p:sldId id="257" r:id="rId4"/>
   </p:sldIdLst>
   <p:sldSz cx="12192000" cy="6858000"/>
   <p:notesSz cx="6858000" cy="9144000"/>
@@ -244,7 +245,7 @@
           <a:p>
             <a:fld id="{7696AFBC-2CDB-4711-9692-11F44B2F2057}" type="datetimeFigureOut">
               <a:rPr lang="en-US" smtClean="0"/>
-              <a:t>7/1/2024</a:t>
+              <a:t>7/8/2024</a:t>
             </a:fld>
             <a:endParaRPr lang="en-US"/>
           </a:p>
@@ -414,7 +415,7 @@
           <a:p>
             <a:fld id="{7696AFBC-2CDB-4711-9692-11F44B2F2057}" type="datetimeFigureOut">
               <a:rPr lang="en-US" smtClean="0"/>
-              <a:t>7/1/2024</a:t>
+              <a:t>7/8/2024</a:t>
             </a:fld>
             <a:endParaRPr lang="en-US"/>
           </a:p>
@@ -594,7 +595,7 @@
           <a:p>
             <a:fld id="{7696AFBC-2CDB-4711-9692-11F44B2F2057}" type="datetimeFigureOut">
               <a:rPr lang="en-US" smtClean="0"/>
-              <a:t>7/1/2024</a:t>
+              <a:t>7/8/2024</a:t>
             </a:fld>
             <a:endParaRPr lang="en-US"/>
           </a:p>
@@ -764,7 +765,7 @@
           <a:p>
             <a:fld id="{7696AFBC-2CDB-4711-9692-11F44B2F2057}" type="datetimeFigureOut">
               <a:rPr lang="en-US" smtClean="0"/>
-              <a:t>7/1/2024</a:t>
+              <a:t>7/8/2024</a:t>
             </a:fld>
             <a:endParaRPr lang="en-US"/>
           </a:p>
@@ -1010,7 +1011,7 @@
           <a:p>
             <a:fld id="{7696AFBC-2CDB-4711-9692-11F44B2F2057}" type="datetimeFigureOut">
               <a:rPr lang="en-US" smtClean="0"/>
-              <a:t>7/1/2024</a:t>
+              <a:t>7/8/2024</a:t>
             </a:fld>
             <a:endParaRPr lang="en-US"/>
           </a:p>
@@ -1242,7 +1243,7 @@
           <a:p>
             <a:fld id="{7696AFBC-2CDB-4711-9692-11F44B2F2057}" type="datetimeFigureOut">
               <a:rPr lang="en-US" smtClean="0"/>
-              <a:t>7/1/2024</a:t>
+              <a:t>7/8/2024</a:t>
             </a:fld>
             <a:endParaRPr lang="en-US"/>
           </a:p>
@@ -1609,7 +1610,7 @@
           <a:p>
             <a:fld id="{7696AFBC-2CDB-4711-9692-11F44B2F2057}" type="datetimeFigureOut">
               <a:rPr lang="en-US" smtClean="0"/>
-              <a:t>7/1/2024</a:t>
+              <a:t>7/8/2024</a:t>
             </a:fld>
             <a:endParaRPr lang="en-US"/>
           </a:p>
@@ -1727,7 +1728,7 @@
           <a:p>
             <a:fld id="{7696AFBC-2CDB-4711-9692-11F44B2F2057}" type="datetimeFigureOut">
               <a:rPr lang="en-US" smtClean="0"/>
-              <a:t>7/1/2024</a:t>
+              <a:t>7/8/2024</a:t>
             </a:fld>
             <a:endParaRPr lang="en-US"/>
           </a:p>
@@ -1822,7 +1823,7 @@
           <a:p>
             <a:fld id="{7696AFBC-2CDB-4711-9692-11F44B2F2057}" type="datetimeFigureOut">
               <a:rPr lang="en-US" smtClean="0"/>
-              <a:t>7/1/2024</a:t>
+              <a:t>7/8/2024</a:t>
             </a:fld>
             <a:endParaRPr lang="en-US"/>
           </a:p>
@@ -2099,7 +2100,7 @@
           <a:p>
             <a:fld id="{7696AFBC-2CDB-4711-9692-11F44B2F2057}" type="datetimeFigureOut">
               <a:rPr lang="en-US" smtClean="0"/>
-              <a:t>7/1/2024</a:t>
+              <a:t>7/8/2024</a:t>
             </a:fld>
             <a:endParaRPr lang="en-US"/>
           </a:p>
@@ -2356,7 +2357,7 @@
           <a:p>
             <a:fld id="{7696AFBC-2CDB-4711-9692-11F44B2F2057}" type="datetimeFigureOut">
               <a:rPr lang="en-US" smtClean="0"/>
-              <a:t>7/1/2024</a:t>
+              <a:t>7/8/2024</a:t>
             </a:fld>
             <a:endParaRPr lang="en-US"/>
           </a:p>
@@ -2569,7 +2570,7 @@
           <a:p>
             <a:fld id="{7696AFBC-2CDB-4711-9692-11F44B2F2057}" type="datetimeFigureOut">
               <a:rPr lang="en-US" smtClean="0"/>
-              <a:t>7/1/2024</a:t>
+              <a:t>7/8/2024</a:t>
             </a:fld>
             <a:endParaRPr lang="en-US"/>
           </a:p>
@@ -3928,6 +3929,41 @@
           </a:p>
         </p:txBody>
       </p:sp>
+      <p:sp>
+        <p:nvSpPr>
+          <p:cNvPr id="2" name="TextBox 1">
+            <a:extLst>
+              <a:ext uri="{FF2B5EF4-FFF2-40B4-BE49-F238E27FC236}">
+                <a16:creationId xmlns:a16="http://schemas.microsoft.com/office/drawing/2014/main" id="{83C86B4B-7A7C-7E1A-0F3D-CB7F8A3D6C7C}"/>
+              </a:ext>
+            </a:extLst>
+          </p:cNvPr>
+          <p:cNvSpPr txBox="1"/>
+          <p:nvPr/>
+        </p:nvSpPr>
+        <p:spPr>
+          <a:xfrm>
+            <a:off x="335499" y="249980"/>
+            <a:ext cx="1677497" cy="369332"/>
+          </a:xfrm>
+          <a:prstGeom prst="rect">
+            <a:avLst/>
+          </a:prstGeom>
+          <a:noFill/>
+        </p:spPr>
+        <p:txBody>
+          <a:bodyPr wrap="square" rtlCol="0">
+            <a:spAutoFit/>
+          </a:bodyPr>
+          <a:lstStyle/>
+          <a:p>
+            <a:r>
+              <a:rPr lang="en-US" dirty="0"/>
+              <a:t>1RD8</a:t>
+            </a:r>
+          </a:p>
+        </p:txBody>
+      </p:sp>
     </p:spTree>
     <p:extLst>
       <p:ext uri="{BB962C8B-B14F-4D97-AF65-F5344CB8AC3E}">
@@ -3942,6 +3978,995 @@
 </file>
 
 <file path=ppt/slides/slide2.xml><?xml version="1.0" encoding="utf-8"?>
+<p:sld xmlns:a="http://schemas.openxmlformats.org/drawingml/2006/main" xmlns:r="http://schemas.openxmlformats.org/officeDocument/2006/relationships" xmlns:p="http://schemas.openxmlformats.org/presentationml/2006/main">
+  <p:cSld>
+    <p:spTree>
+      <p:nvGrpSpPr>
+        <p:cNvPr id="1" name=""/>
+        <p:cNvGrpSpPr/>
+        <p:nvPr/>
+      </p:nvGrpSpPr>
+      <p:grpSpPr>
+        <a:xfrm>
+          <a:off x="0" y="0"/>
+          <a:ext cx="0" cy="0"/>
+          <a:chOff x="0" y="0"/>
+          <a:chExt cx="0" cy="0"/>
+        </a:xfrm>
+      </p:grpSpPr>
+      <p:pic>
+        <p:nvPicPr>
+          <p:cNvPr id="7" name="Picture 6" descr="A colorful structure with black background&#10;&#10;Description automatically generated">
+            <a:extLst>
+              <a:ext uri="{FF2B5EF4-FFF2-40B4-BE49-F238E27FC236}">
+                <a16:creationId xmlns:a16="http://schemas.microsoft.com/office/drawing/2014/main" id="{7DD58C16-3417-34A9-F0B3-9C1164CCE5D2}"/>
+              </a:ext>
+            </a:extLst>
+          </p:cNvPr>
+          <p:cNvPicPr>
+            <a:picLocks noChangeAspect="1"/>
+          </p:cNvPicPr>
+          <p:nvPr/>
+        </p:nvPicPr>
+        <p:blipFill>
+          <a:blip r:embed="rId2">
+            <a:extLst>
+              <a:ext uri="{28A0092B-C50C-407E-A947-70E740481C1C}">
+                <a14:useLocalDpi xmlns:a14="http://schemas.microsoft.com/office/drawing/2010/main" val="0"/>
+              </a:ext>
+            </a:extLst>
+          </a:blip>
+          <a:stretch>
+            <a:fillRect/>
+          </a:stretch>
+        </p:blipFill>
+        <p:spPr>
+          <a:xfrm>
+            <a:off x="2667000" y="0"/>
+            <a:ext cx="6858000" cy="6858000"/>
+          </a:xfrm>
+          <a:prstGeom prst="rect">
+            <a:avLst/>
+          </a:prstGeom>
+        </p:spPr>
+      </p:pic>
+      <p:graphicFrame>
+        <p:nvGraphicFramePr>
+          <p:cNvPr id="8" name="Table 7">
+            <a:extLst>
+              <a:ext uri="{FF2B5EF4-FFF2-40B4-BE49-F238E27FC236}">
+                <a16:creationId xmlns:a16="http://schemas.microsoft.com/office/drawing/2014/main" id="{BD64B1B4-4508-98F3-602E-96FAD59EF762}"/>
+              </a:ext>
+            </a:extLst>
+          </p:cNvPr>
+          <p:cNvGraphicFramePr>
+            <a:graphicFrameLocks noGrp="1"/>
+          </p:cNvGraphicFramePr>
+          <p:nvPr>
+            <p:extLst>
+              <p:ext uri="{D42A27DB-BD31-4B8C-83A1-F6EECF244321}">
+                <p14:modId xmlns:p14="http://schemas.microsoft.com/office/powerpoint/2010/main" val="2140008175"/>
+              </p:ext>
+            </p:extLst>
+          </p:nvPr>
+        </p:nvGraphicFramePr>
+        <p:xfrm>
+          <a:off x="3450260" y="5823024"/>
+          <a:ext cx="4480724" cy="640082"/>
+        </p:xfrm>
+        <a:graphic>
+          <a:graphicData uri="http://schemas.openxmlformats.org/drawingml/2006/table">
+            <a:tbl>
+              <a:tblPr firstRow="1" bandRow="1">
+                <a:tableStyleId>{5C22544A-7EE6-4342-B048-85BDC9FD1C3A}</a:tableStyleId>
+              </a:tblPr>
+              <a:tblGrid>
+                <a:gridCol w="822960">
+                  <a:extLst>
+                    <a:ext uri="{9D8B030D-6E8A-4147-A177-3AD203B41FA5}">
+                      <a16:colId xmlns:a16="http://schemas.microsoft.com/office/drawing/2014/main" val="2389605932"/>
+                    </a:ext>
+                  </a:extLst>
+                </a:gridCol>
+                <a:gridCol w="2834640">
+                  <a:extLst>
+                    <a:ext uri="{9D8B030D-6E8A-4147-A177-3AD203B41FA5}">
+                      <a16:colId xmlns:a16="http://schemas.microsoft.com/office/drawing/2014/main" val="49573202"/>
+                    </a:ext>
+                  </a:extLst>
+                </a:gridCol>
+                <a:gridCol w="823124">
+                  <a:extLst>
+                    <a:ext uri="{9D8B030D-6E8A-4147-A177-3AD203B41FA5}">
+                      <a16:colId xmlns:a16="http://schemas.microsoft.com/office/drawing/2014/main" val="36207534"/>
+                    </a:ext>
+                  </a:extLst>
+                </a:gridCol>
+              </a:tblGrid>
+              <a:tr h="320041">
+                <a:tc gridSpan="3">
+                  <a:txBody>
+                    <a:bodyPr/>
+                    <a:lstStyle/>
+                    <a:p>
+                      <a:endParaRPr lang="en-US" sz="1100" dirty="0"/>
+                    </a:p>
+                  </a:txBody>
+                  <a:tcPr marT="45721" marB="45721">
+                    <a:lnL w="12700" cap="flat" cmpd="sng" algn="ctr">
+                      <a:solidFill>
+                        <a:schemeClr val="tx1"/>
+                      </a:solidFill>
+                      <a:prstDash val="solid"/>
+                      <a:round/>
+                      <a:headEnd type="none" w="med" len="med"/>
+                      <a:tailEnd type="none" w="med" len="med"/>
+                    </a:lnL>
+                    <a:lnR w="12700" cap="flat" cmpd="sng" algn="ctr">
+                      <a:solidFill>
+                        <a:schemeClr val="tx1"/>
+                      </a:solidFill>
+                      <a:prstDash val="solid"/>
+                      <a:round/>
+                      <a:headEnd type="none" w="med" len="med"/>
+                      <a:tailEnd type="none" w="med" len="med"/>
+                    </a:lnR>
+                    <a:lnT w="12700" cap="flat" cmpd="sng" algn="ctr">
+                      <a:solidFill>
+                        <a:schemeClr val="tx1"/>
+                      </a:solidFill>
+                      <a:prstDash val="solid"/>
+                      <a:round/>
+                      <a:headEnd type="none" w="med" len="med"/>
+                      <a:tailEnd type="none" w="med" len="med"/>
+                    </a:lnT>
+                    <a:gradFill flip="none" rotWithShape="1">
+                      <a:gsLst>
+                        <a:gs pos="0">
+                          <a:srgbClr val="4B00FF"/>
+                        </a:gs>
+                        <a:gs pos="100000">
+                          <a:srgbClr val="FF0000"/>
+                        </a:gs>
+                      </a:gsLst>
+                      <a:lin ang="0" scaled="1"/>
+                      <a:tileRect/>
+                    </a:gradFill>
+                  </a:tcPr>
+                </a:tc>
+                <a:tc hMerge="1">
+                  <a:txBody>
+                    <a:bodyPr/>
+                    <a:lstStyle/>
+                    <a:p>
+                      <a:endParaRPr lang="en-US" dirty="0"/>
+                    </a:p>
+                  </a:txBody>
+                  <a:tcPr/>
+                </a:tc>
+                <a:tc hMerge="1">
+                  <a:txBody>
+                    <a:bodyPr/>
+                    <a:lstStyle/>
+                    <a:p>
+                      <a:endParaRPr lang="en-US" dirty="0"/>
+                    </a:p>
+                  </a:txBody>
+                  <a:tcPr/>
+                </a:tc>
+                <a:extLst>
+                  <a:ext uri="{0D108BD9-81ED-4DB2-BD59-A6C34878D82A}">
+                    <a16:rowId xmlns:a16="http://schemas.microsoft.com/office/drawing/2014/main" val="2294980685"/>
+                  </a:ext>
+                </a:extLst>
+              </a:tr>
+              <a:tr h="320041">
+                <a:tc>
+                  <a:txBody>
+                    <a:bodyPr/>
+                    <a:lstStyle/>
+                    <a:p>
+                      <a:r>
+                        <a:rPr lang="en-US" sz="1100" dirty="0"/>
+                        <a:t>0%</a:t>
+                      </a:r>
+                    </a:p>
+                  </a:txBody>
+                  <a:tcPr marT="45721" marB="45721">
+                    <a:lnL w="12700" cap="flat" cmpd="sng" algn="ctr">
+                      <a:solidFill>
+                        <a:schemeClr val="tx1"/>
+                      </a:solidFill>
+                      <a:prstDash val="solid"/>
+                      <a:round/>
+                      <a:headEnd type="none" w="med" len="med"/>
+                      <a:tailEnd type="none" w="med" len="med"/>
+                    </a:lnL>
+                    <a:lnB w="12700" cap="flat" cmpd="sng" algn="ctr">
+                      <a:solidFill>
+                        <a:schemeClr val="tx1"/>
+                      </a:solidFill>
+                      <a:prstDash val="solid"/>
+                      <a:round/>
+                      <a:headEnd type="none" w="med" len="med"/>
+                      <a:tailEnd type="none" w="med" len="med"/>
+                    </a:lnB>
+                    <a:solidFill>
+                      <a:schemeClr val="bg1"/>
+                    </a:solidFill>
+                  </a:tcPr>
+                </a:tc>
+                <a:tc>
+                  <a:txBody>
+                    <a:bodyPr/>
+                    <a:lstStyle/>
+                    <a:p>
+                      <a:pPr algn="ctr"/>
+                      <a:r>
+                        <a:rPr lang="en-US" sz="1100" dirty="0"/>
+                        <a:t>Polar Contact Prevalence</a:t>
+                      </a:r>
+                    </a:p>
+                  </a:txBody>
+                  <a:tcPr marT="45721" marB="45721">
+                    <a:lnB w="12700" cap="flat" cmpd="sng" algn="ctr">
+                      <a:solidFill>
+                        <a:schemeClr val="tx1"/>
+                      </a:solidFill>
+                      <a:prstDash val="solid"/>
+                      <a:round/>
+                      <a:headEnd type="none" w="med" len="med"/>
+                      <a:tailEnd type="none" w="med" len="med"/>
+                    </a:lnB>
+                    <a:solidFill>
+                      <a:schemeClr val="bg1"/>
+                    </a:solidFill>
+                  </a:tcPr>
+                </a:tc>
+                <a:tc>
+                  <a:txBody>
+                    <a:bodyPr/>
+                    <a:lstStyle/>
+                    <a:p>
+                      <a:pPr algn="r"/>
+                      <a:r>
+                        <a:rPr lang="en-US" sz="1100" dirty="0"/>
+                        <a:t>26%</a:t>
+                      </a:r>
+                    </a:p>
+                  </a:txBody>
+                  <a:tcPr marT="45721" marB="45721">
+                    <a:lnR w="12700" cap="flat" cmpd="sng" algn="ctr">
+                      <a:solidFill>
+                        <a:schemeClr val="tx1"/>
+                      </a:solidFill>
+                      <a:prstDash val="solid"/>
+                      <a:round/>
+                      <a:headEnd type="none" w="med" len="med"/>
+                      <a:tailEnd type="none" w="med" len="med"/>
+                    </a:lnR>
+                    <a:lnB w="12700" cap="flat" cmpd="sng" algn="ctr">
+                      <a:solidFill>
+                        <a:schemeClr val="tx1"/>
+                      </a:solidFill>
+                      <a:prstDash val="solid"/>
+                      <a:round/>
+                      <a:headEnd type="none" w="med" len="med"/>
+                      <a:tailEnd type="none" w="med" len="med"/>
+                    </a:lnB>
+                    <a:solidFill>
+                      <a:schemeClr val="bg1"/>
+                    </a:solidFill>
+                  </a:tcPr>
+                </a:tc>
+                <a:extLst>
+                  <a:ext uri="{0D108BD9-81ED-4DB2-BD59-A6C34878D82A}">
+                    <a16:rowId xmlns:a16="http://schemas.microsoft.com/office/drawing/2014/main" val="628144052"/>
+                  </a:ext>
+                </a:extLst>
+              </a:tr>
+            </a:tbl>
+          </a:graphicData>
+        </a:graphic>
+      </p:graphicFrame>
+      <p:sp>
+        <p:nvSpPr>
+          <p:cNvPr id="11" name="Rectangle: Rounded Corners 10">
+            <a:extLst>
+              <a:ext uri="{FF2B5EF4-FFF2-40B4-BE49-F238E27FC236}">
+                <a16:creationId xmlns:a16="http://schemas.microsoft.com/office/drawing/2014/main" id="{71004C20-087B-B55E-826B-654946B4F7F8}"/>
+              </a:ext>
+            </a:extLst>
+          </p:cNvPr>
+          <p:cNvSpPr/>
+          <p:nvPr/>
+        </p:nvSpPr>
+        <p:spPr>
+          <a:xfrm>
+            <a:off x="6308849" y="4234285"/>
+            <a:ext cx="934423" cy="307026"/>
+          </a:xfrm>
+          <a:prstGeom prst="roundRect">
+            <a:avLst>
+              <a:gd name="adj" fmla="val 50000"/>
+            </a:avLst>
+          </a:prstGeom>
+          <a:solidFill>
+            <a:srgbClr val="EE005C"/>
+          </a:solidFill>
+          <a:ln>
+            <a:solidFill>
+              <a:schemeClr val="tx1"/>
+            </a:solidFill>
+          </a:ln>
+        </p:spPr>
+        <p:style>
+          <a:lnRef idx="2">
+            <a:schemeClr val="accent1">
+              <a:shade val="15000"/>
+            </a:schemeClr>
+          </a:lnRef>
+          <a:fillRef idx="1">
+            <a:schemeClr val="accent1"/>
+          </a:fillRef>
+          <a:effectRef idx="0">
+            <a:schemeClr val="accent1"/>
+          </a:effectRef>
+          <a:fontRef idx="minor">
+            <a:schemeClr val="lt1"/>
+          </a:fontRef>
+        </p:style>
+        <p:txBody>
+          <a:bodyPr rtlCol="0" anchor="ctr"/>
+          <a:lstStyle/>
+          <a:p>
+            <a:pPr algn="ctr"/>
+            <a:r>
+              <a:rPr lang="en-US" sz="1801" dirty="0"/>
+              <a:t>R149</a:t>
+            </a:r>
+          </a:p>
+        </p:txBody>
+      </p:sp>
+      <p:sp>
+        <p:nvSpPr>
+          <p:cNvPr id="12" name="Rectangle: Rounded Corners 11">
+            <a:extLst>
+              <a:ext uri="{FF2B5EF4-FFF2-40B4-BE49-F238E27FC236}">
+                <a16:creationId xmlns:a16="http://schemas.microsoft.com/office/drawing/2014/main" id="{B49E138A-D766-0397-4BBD-41CA131A7922}"/>
+              </a:ext>
+            </a:extLst>
+          </p:cNvPr>
+          <p:cNvSpPr/>
+          <p:nvPr/>
+        </p:nvSpPr>
+        <p:spPr>
+          <a:xfrm>
+            <a:off x="3171231" y="3100274"/>
+            <a:ext cx="934423" cy="307026"/>
+          </a:xfrm>
+          <a:prstGeom prst="roundRect">
+            <a:avLst>
+              <a:gd name="adj" fmla="val 50000"/>
+            </a:avLst>
+          </a:prstGeom>
+          <a:solidFill>
+            <a:srgbClr val="FF0000"/>
+          </a:solidFill>
+          <a:ln>
+            <a:solidFill>
+              <a:schemeClr val="tx1"/>
+            </a:solidFill>
+          </a:ln>
+        </p:spPr>
+        <p:style>
+          <a:lnRef idx="2">
+            <a:schemeClr val="accent1">
+              <a:shade val="15000"/>
+            </a:schemeClr>
+          </a:lnRef>
+          <a:fillRef idx="1">
+            <a:schemeClr val="accent1"/>
+          </a:fillRef>
+          <a:effectRef idx="0">
+            <a:schemeClr val="accent1"/>
+          </a:effectRef>
+          <a:fontRef idx="minor">
+            <a:schemeClr val="lt1"/>
+          </a:fontRef>
+        </p:style>
+        <p:txBody>
+          <a:bodyPr rtlCol="0" anchor="ctr"/>
+          <a:lstStyle/>
+          <a:p>
+            <a:pPr algn="ctr"/>
+            <a:r>
+              <a:rPr lang="en-US" sz="1801" dirty="0"/>
+              <a:t>K222</a:t>
+            </a:r>
+          </a:p>
+        </p:txBody>
+      </p:sp>
+      <p:sp>
+        <p:nvSpPr>
+          <p:cNvPr id="13" name="Rectangle: Rounded Corners 12">
+            <a:extLst>
+              <a:ext uri="{FF2B5EF4-FFF2-40B4-BE49-F238E27FC236}">
+                <a16:creationId xmlns:a16="http://schemas.microsoft.com/office/drawing/2014/main" id="{F1723556-064A-8F42-6F94-1577CB6F55AF}"/>
+              </a:ext>
+            </a:extLst>
+          </p:cNvPr>
+          <p:cNvSpPr/>
+          <p:nvPr/>
+        </p:nvSpPr>
+        <p:spPr>
+          <a:xfrm>
+            <a:off x="3210075" y="2039350"/>
+            <a:ext cx="934423" cy="307026"/>
+          </a:xfrm>
+          <a:prstGeom prst="roundRect">
+            <a:avLst>
+              <a:gd name="adj" fmla="val 50000"/>
+            </a:avLst>
+          </a:prstGeom>
+          <a:solidFill>
+            <a:srgbClr val="FF0000"/>
+          </a:solidFill>
+          <a:ln>
+            <a:solidFill>
+              <a:schemeClr val="tx1"/>
+            </a:solidFill>
+          </a:ln>
+        </p:spPr>
+        <p:style>
+          <a:lnRef idx="2">
+            <a:schemeClr val="accent1">
+              <a:shade val="15000"/>
+            </a:schemeClr>
+          </a:lnRef>
+          <a:fillRef idx="1">
+            <a:schemeClr val="accent1"/>
+          </a:fillRef>
+          <a:effectRef idx="0">
+            <a:schemeClr val="accent1"/>
+          </a:effectRef>
+          <a:fontRef idx="minor">
+            <a:schemeClr val="lt1"/>
+          </a:fontRef>
+        </p:style>
+        <p:txBody>
+          <a:bodyPr rtlCol="0" anchor="ctr"/>
+          <a:lstStyle/>
+          <a:p>
+            <a:pPr algn="ctr"/>
+            <a:r>
+              <a:rPr lang="en-US" sz="1801" dirty="0"/>
+              <a:t>K193</a:t>
+            </a:r>
+          </a:p>
+        </p:txBody>
+      </p:sp>
+      <p:sp>
+        <p:nvSpPr>
+          <p:cNvPr id="14" name="Rectangle: Rounded Corners 13">
+            <a:extLst>
+              <a:ext uri="{FF2B5EF4-FFF2-40B4-BE49-F238E27FC236}">
+                <a16:creationId xmlns:a16="http://schemas.microsoft.com/office/drawing/2014/main" id="{B88AF7DB-ED25-4F98-4669-D40512358EA4}"/>
+              </a:ext>
+            </a:extLst>
+          </p:cNvPr>
+          <p:cNvSpPr/>
+          <p:nvPr/>
+        </p:nvSpPr>
+        <p:spPr>
+          <a:xfrm>
+            <a:off x="5990531" y="393524"/>
+            <a:ext cx="934423" cy="307026"/>
+          </a:xfrm>
+          <a:prstGeom prst="roundRect">
+            <a:avLst>
+              <a:gd name="adj" fmla="val 50000"/>
+            </a:avLst>
+          </a:prstGeom>
+          <a:solidFill>
+            <a:srgbClr val="EE005C"/>
+          </a:solidFill>
+          <a:ln>
+            <a:solidFill>
+              <a:schemeClr val="tx1"/>
+            </a:solidFill>
+          </a:ln>
+        </p:spPr>
+        <p:style>
+          <a:lnRef idx="2">
+            <a:schemeClr val="accent1">
+              <a:shade val="15000"/>
+            </a:schemeClr>
+          </a:lnRef>
+          <a:fillRef idx="1">
+            <a:schemeClr val="accent1"/>
+          </a:fillRef>
+          <a:effectRef idx="0">
+            <a:schemeClr val="accent1"/>
+          </a:effectRef>
+          <a:fontRef idx="minor">
+            <a:schemeClr val="lt1"/>
+          </a:fontRef>
+        </p:style>
+        <p:txBody>
+          <a:bodyPr rtlCol="0" anchor="ctr"/>
+          <a:lstStyle/>
+          <a:p>
+            <a:pPr algn="ctr"/>
+            <a:r>
+              <a:rPr lang="en-US" sz="1801" dirty="0"/>
+              <a:t>N158</a:t>
+            </a:r>
+          </a:p>
+        </p:txBody>
+      </p:sp>
+      <p:sp>
+        <p:nvSpPr>
+          <p:cNvPr id="15" name="Rectangle: Rounded Corners 14">
+            <a:extLst>
+              <a:ext uri="{FF2B5EF4-FFF2-40B4-BE49-F238E27FC236}">
+                <a16:creationId xmlns:a16="http://schemas.microsoft.com/office/drawing/2014/main" id="{CD0062DE-D092-B515-6065-CFE2FC765677}"/>
+              </a:ext>
+            </a:extLst>
+          </p:cNvPr>
+          <p:cNvSpPr/>
+          <p:nvPr/>
+        </p:nvSpPr>
+        <p:spPr>
+          <a:xfrm>
+            <a:off x="4570737" y="1435820"/>
+            <a:ext cx="934423" cy="307026"/>
+          </a:xfrm>
+          <a:prstGeom prst="roundRect">
+            <a:avLst>
+              <a:gd name="adj" fmla="val 50000"/>
+            </a:avLst>
+          </a:prstGeom>
+          <a:solidFill>
+            <a:srgbClr val="FF0000"/>
+          </a:solidFill>
+          <a:ln>
+            <a:solidFill>
+              <a:schemeClr val="tx1"/>
+            </a:solidFill>
+          </a:ln>
+        </p:spPr>
+        <p:style>
+          <a:lnRef idx="2">
+            <a:schemeClr val="accent1">
+              <a:shade val="15000"/>
+            </a:schemeClr>
+          </a:lnRef>
+          <a:fillRef idx="1">
+            <a:schemeClr val="accent1"/>
+          </a:fillRef>
+          <a:effectRef idx="0">
+            <a:schemeClr val="accent1"/>
+          </a:effectRef>
+          <a:fontRef idx="minor">
+            <a:schemeClr val="lt1"/>
+          </a:fontRef>
+        </p:style>
+        <p:txBody>
+          <a:bodyPr rtlCol="0" anchor="ctr"/>
+          <a:lstStyle/>
+          <a:p>
+            <a:pPr algn="ctr"/>
+            <a:r>
+              <a:rPr lang="en-US" sz="1801" dirty="0"/>
+              <a:t>K156</a:t>
+            </a:r>
+          </a:p>
+        </p:txBody>
+      </p:sp>
+      <p:sp>
+        <p:nvSpPr>
+          <p:cNvPr id="17" name="Rectangle: Rounded Corners 16">
+            <a:extLst>
+              <a:ext uri="{FF2B5EF4-FFF2-40B4-BE49-F238E27FC236}">
+                <a16:creationId xmlns:a16="http://schemas.microsoft.com/office/drawing/2014/main" id="{C4868DFC-DE47-ED03-4BC4-FA3D6A009DA2}"/>
+              </a:ext>
+            </a:extLst>
+          </p:cNvPr>
+          <p:cNvSpPr/>
+          <p:nvPr/>
+        </p:nvSpPr>
+        <p:spPr>
+          <a:xfrm>
+            <a:off x="4227155" y="465799"/>
+            <a:ext cx="934423" cy="307026"/>
+          </a:xfrm>
+          <a:prstGeom prst="roundRect">
+            <a:avLst>
+              <a:gd name="adj" fmla="val 50000"/>
+            </a:avLst>
+          </a:prstGeom>
+          <a:solidFill>
+            <a:srgbClr val="C700AA"/>
+          </a:solidFill>
+          <a:ln>
+            <a:solidFill>
+              <a:schemeClr val="tx1"/>
+            </a:solidFill>
+          </a:ln>
+        </p:spPr>
+        <p:style>
+          <a:lnRef idx="2">
+            <a:schemeClr val="accent1">
+              <a:shade val="15000"/>
+            </a:schemeClr>
+          </a:lnRef>
+          <a:fillRef idx="1">
+            <a:schemeClr val="accent1"/>
+          </a:fillRef>
+          <a:effectRef idx="0">
+            <a:schemeClr val="accent1"/>
+          </a:effectRef>
+          <a:fontRef idx="minor">
+            <a:schemeClr val="lt1"/>
+          </a:fontRef>
+        </p:style>
+        <p:txBody>
+          <a:bodyPr rtlCol="0" anchor="ctr"/>
+          <a:lstStyle/>
+          <a:p>
+            <a:pPr algn="ctr"/>
+            <a:r>
+              <a:rPr lang="en-US" sz="1801" dirty="0"/>
+              <a:t>S159</a:t>
+            </a:r>
+          </a:p>
+        </p:txBody>
+      </p:sp>
+      <p:sp>
+        <p:nvSpPr>
+          <p:cNvPr id="20" name="Rectangle: Rounded Corners 19">
+            <a:extLst>
+              <a:ext uri="{FF2B5EF4-FFF2-40B4-BE49-F238E27FC236}">
+                <a16:creationId xmlns:a16="http://schemas.microsoft.com/office/drawing/2014/main" id="{EF05FF32-A917-BED9-8DAF-E1A1B1D18192}"/>
+              </a:ext>
+            </a:extLst>
+          </p:cNvPr>
+          <p:cNvSpPr/>
+          <p:nvPr/>
+        </p:nvSpPr>
+        <p:spPr>
+          <a:xfrm>
+            <a:off x="2763225" y="3740417"/>
+            <a:ext cx="934423" cy="307026"/>
+          </a:xfrm>
+          <a:prstGeom prst="roundRect">
+            <a:avLst>
+              <a:gd name="adj" fmla="val 50000"/>
+            </a:avLst>
+          </a:prstGeom>
+          <a:solidFill>
+            <a:srgbClr val="C700AA"/>
+          </a:solidFill>
+          <a:ln>
+            <a:solidFill>
+              <a:schemeClr val="tx1"/>
+            </a:solidFill>
+          </a:ln>
+        </p:spPr>
+        <p:style>
+          <a:lnRef idx="2">
+            <a:schemeClr val="accent1">
+              <a:shade val="15000"/>
+            </a:schemeClr>
+          </a:lnRef>
+          <a:fillRef idx="1">
+            <a:schemeClr val="accent1"/>
+          </a:fillRef>
+          <a:effectRef idx="0">
+            <a:schemeClr val="accent1"/>
+          </a:effectRef>
+          <a:fontRef idx="minor">
+            <a:schemeClr val="lt1"/>
+          </a:fontRef>
+        </p:style>
+        <p:txBody>
+          <a:bodyPr rtlCol="0" anchor="ctr"/>
+          <a:lstStyle/>
+          <a:p>
+            <a:pPr algn="ctr"/>
+            <a:r>
+              <a:rPr lang="en-US" sz="1801" dirty="0"/>
+              <a:t>S137</a:t>
+            </a:r>
+          </a:p>
+        </p:txBody>
+      </p:sp>
+      <p:sp>
+        <p:nvSpPr>
+          <p:cNvPr id="21" name="Rectangle: Rounded Corners 20">
+            <a:extLst>
+              <a:ext uri="{FF2B5EF4-FFF2-40B4-BE49-F238E27FC236}">
+                <a16:creationId xmlns:a16="http://schemas.microsoft.com/office/drawing/2014/main" id="{82688E8A-E5DB-AF30-CEA4-8D40992E2DE1}"/>
+              </a:ext>
+            </a:extLst>
+          </p:cNvPr>
+          <p:cNvSpPr/>
+          <p:nvPr/>
+        </p:nvSpPr>
+        <p:spPr>
+          <a:xfrm>
+            <a:off x="6615624" y="2458704"/>
+            <a:ext cx="934423" cy="307026"/>
+          </a:xfrm>
+          <a:prstGeom prst="roundRect">
+            <a:avLst>
+              <a:gd name="adj" fmla="val 50000"/>
+            </a:avLst>
+          </a:prstGeom>
+          <a:solidFill>
+            <a:srgbClr val="C700AA"/>
+          </a:solidFill>
+          <a:ln>
+            <a:solidFill>
+              <a:schemeClr val="tx1"/>
+            </a:solidFill>
+          </a:ln>
+        </p:spPr>
+        <p:style>
+          <a:lnRef idx="2">
+            <a:schemeClr val="accent1">
+              <a:shade val="15000"/>
+            </a:schemeClr>
+          </a:lnRef>
+          <a:fillRef idx="1">
+            <a:schemeClr val="accent1"/>
+          </a:fillRef>
+          <a:effectRef idx="0">
+            <a:schemeClr val="accent1"/>
+          </a:effectRef>
+          <a:fontRef idx="minor">
+            <a:schemeClr val="lt1"/>
+          </a:fontRef>
+        </p:style>
+        <p:txBody>
+          <a:bodyPr rtlCol="0" anchor="ctr"/>
+          <a:lstStyle/>
+          <a:p>
+            <a:pPr algn="ctr"/>
+            <a:r>
+              <a:rPr lang="en-US" sz="1801" dirty="0"/>
+              <a:t>A132</a:t>
+            </a:r>
+          </a:p>
+        </p:txBody>
+      </p:sp>
+      <p:sp>
+        <p:nvSpPr>
+          <p:cNvPr id="22" name="Rectangle: Rounded Corners 21">
+            <a:extLst>
+              <a:ext uri="{FF2B5EF4-FFF2-40B4-BE49-F238E27FC236}">
+                <a16:creationId xmlns:a16="http://schemas.microsoft.com/office/drawing/2014/main" id="{07BE36E7-6D1C-2CE4-F42E-54F5EEE295EA}"/>
+              </a:ext>
+            </a:extLst>
+          </p:cNvPr>
+          <p:cNvSpPr/>
+          <p:nvPr/>
+        </p:nvSpPr>
+        <p:spPr>
+          <a:xfrm>
+            <a:off x="5223411" y="3433391"/>
+            <a:ext cx="934423" cy="307026"/>
+          </a:xfrm>
+          <a:prstGeom prst="roundRect">
+            <a:avLst>
+              <a:gd name="adj" fmla="val 50000"/>
+            </a:avLst>
+          </a:prstGeom>
+          <a:solidFill>
+            <a:srgbClr val="C700AA"/>
+          </a:solidFill>
+          <a:ln>
+            <a:solidFill>
+              <a:schemeClr val="tx1"/>
+            </a:solidFill>
+          </a:ln>
+        </p:spPr>
+        <p:style>
+          <a:lnRef idx="2">
+            <a:schemeClr val="accent1">
+              <a:shade val="15000"/>
+            </a:schemeClr>
+          </a:lnRef>
+          <a:fillRef idx="1">
+            <a:schemeClr val="accent1"/>
+          </a:fillRef>
+          <a:effectRef idx="0">
+            <a:schemeClr val="accent1"/>
+          </a:effectRef>
+          <a:fontRef idx="minor">
+            <a:schemeClr val="lt1"/>
+          </a:fontRef>
+        </p:style>
+        <p:txBody>
+          <a:bodyPr rtlCol="0" anchor="ctr"/>
+          <a:lstStyle/>
+          <a:p>
+            <a:pPr algn="ctr"/>
+            <a:r>
+              <a:rPr lang="en-US" sz="1801" dirty="0"/>
+              <a:t>K144</a:t>
+            </a:r>
+          </a:p>
+        </p:txBody>
+      </p:sp>
+      <p:sp>
+        <p:nvSpPr>
+          <p:cNvPr id="23" name="Rectangle: Rounded Corners 22">
+            <a:extLst>
+              <a:ext uri="{FF2B5EF4-FFF2-40B4-BE49-F238E27FC236}">
+                <a16:creationId xmlns:a16="http://schemas.microsoft.com/office/drawing/2014/main" id="{4167C9E9-3998-935F-B335-F9235E4355A0}"/>
+              </a:ext>
+            </a:extLst>
+          </p:cNvPr>
+          <p:cNvSpPr/>
+          <p:nvPr/>
+        </p:nvSpPr>
+        <p:spPr>
+          <a:xfrm>
+            <a:off x="6556418" y="1877837"/>
+            <a:ext cx="934423" cy="307026"/>
+          </a:xfrm>
+          <a:prstGeom prst="roundRect">
+            <a:avLst>
+              <a:gd name="adj" fmla="val 50000"/>
+            </a:avLst>
+          </a:prstGeom>
+          <a:solidFill>
+            <a:srgbClr val="C700AA"/>
+          </a:solidFill>
+          <a:ln>
+            <a:solidFill>
+              <a:schemeClr val="tx1"/>
+            </a:solidFill>
+          </a:ln>
+        </p:spPr>
+        <p:style>
+          <a:lnRef idx="2">
+            <a:schemeClr val="accent1">
+              <a:shade val="15000"/>
+            </a:schemeClr>
+          </a:lnRef>
+          <a:fillRef idx="1">
+            <a:schemeClr val="accent1"/>
+          </a:fillRef>
+          <a:effectRef idx="0">
+            <a:schemeClr val="accent1"/>
+          </a:effectRef>
+          <a:fontRef idx="minor">
+            <a:schemeClr val="lt1"/>
+          </a:fontRef>
+        </p:style>
+        <p:txBody>
+          <a:bodyPr rtlCol="0" anchor="ctr"/>
+          <a:lstStyle/>
+          <a:p>
+            <a:pPr algn="ctr"/>
+            <a:r>
+              <a:rPr lang="en-US" sz="1801" dirty="0"/>
+              <a:t>H130</a:t>
+            </a:r>
+          </a:p>
+        </p:txBody>
+      </p:sp>
+      <p:sp>
+        <p:nvSpPr>
+          <p:cNvPr id="26" name="Rectangle: Rounded Corners 25">
+            <a:extLst>
+              <a:ext uri="{FF2B5EF4-FFF2-40B4-BE49-F238E27FC236}">
+                <a16:creationId xmlns:a16="http://schemas.microsoft.com/office/drawing/2014/main" id="{E6F424A8-38DF-9F5D-6D9B-B8F0A7E07EDC}"/>
+              </a:ext>
+            </a:extLst>
+          </p:cNvPr>
+          <p:cNvSpPr/>
+          <p:nvPr/>
+        </p:nvSpPr>
+        <p:spPr>
+          <a:xfrm>
+            <a:off x="8382487" y="5316586"/>
+            <a:ext cx="934423" cy="307026"/>
+          </a:xfrm>
+          <a:prstGeom prst="roundRect">
+            <a:avLst>
+              <a:gd name="adj" fmla="val 50000"/>
+            </a:avLst>
+          </a:prstGeom>
+          <a:solidFill>
+            <a:srgbClr val="EE005C"/>
+          </a:solidFill>
+          <a:ln>
+            <a:solidFill>
+              <a:schemeClr val="tx1"/>
+            </a:solidFill>
+          </a:ln>
+        </p:spPr>
+        <p:style>
+          <a:lnRef idx="2">
+            <a:schemeClr val="accent1">
+              <a:shade val="15000"/>
+            </a:schemeClr>
+          </a:lnRef>
+          <a:fillRef idx="1">
+            <a:schemeClr val="accent1"/>
+          </a:fillRef>
+          <a:effectRef idx="0">
+            <a:schemeClr val="accent1"/>
+          </a:effectRef>
+          <a:fontRef idx="minor">
+            <a:schemeClr val="lt1"/>
+          </a:fontRef>
+        </p:style>
+        <p:txBody>
+          <a:bodyPr rtlCol="0" anchor="ctr"/>
+          <a:lstStyle/>
+          <a:p>
+            <a:pPr algn="ctr"/>
+            <a:r>
+              <a:rPr lang="en-US" sz="1801" dirty="0"/>
+              <a:t>H117</a:t>
+            </a:r>
+          </a:p>
+        </p:txBody>
+      </p:sp>
+      <p:sp>
+        <p:nvSpPr>
+          <p:cNvPr id="2" name="TextBox 1">
+            <a:extLst>
+              <a:ext uri="{FF2B5EF4-FFF2-40B4-BE49-F238E27FC236}">
+                <a16:creationId xmlns:a16="http://schemas.microsoft.com/office/drawing/2014/main" id="{83C86B4B-7A7C-7E1A-0F3D-CB7F8A3D6C7C}"/>
+              </a:ext>
+            </a:extLst>
+          </p:cNvPr>
+          <p:cNvSpPr txBox="1"/>
+          <p:nvPr/>
+        </p:nvSpPr>
+        <p:spPr>
+          <a:xfrm>
+            <a:off x="335499" y="249980"/>
+            <a:ext cx="1677497" cy="369332"/>
+          </a:xfrm>
+          <a:prstGeom prst="rect">
+            <a:avLst/>
+          </a:prstGeom>
+          <a:noFill/>
+        </p:spPr>
+        <p:txBody>
+          <a:bodyPr wrap="square" rtlCol="0">
+            <a:spAutoFit/>
+          </a:bodyPr>
+          <a:lstStyle/>
+          <a:p>
+            <a:r>
+              <a:rPr lang="en-US" dirty="0"/>
+              <a:t>2FK0</a:t>
+            </a:r>
+          </a:p>
+        </p:txBody>
+      </p:sp>
+    </p:spTree>
+    <p:extLst>
+      <p:ext uri="{BB962C8B-B14F-4D97-AF65-F5344CB8AC3E}">
+        <p14:creationId xmlns:p14="http://schemas.microsoft.com/office/powerpoint/2010/main" val="2669518275"/>
+      </p:ext>
+    </p:extLst>
+  </p:cSld>
+  <p:clrMapOvr>
+    <a:masterClrMapping/>
+  </p:clrMapOvr>
+</p:sld>
+</file>
+
+<file path=ppt/slides/slide3.xml><?xml version="1.0" encoding="utf-8"?>
 <p:sld xmlns:a="http://schemas.openxmlformats.org/drawingml/2006/main" xmlns:r="http://schemas.openxmlformats.org/officeDocument/2006/relationships" xmlns:p="http://schemas.openxmlformats.org/presentationml/2006/main">
   <p:cSld>
     <p:spTree>

</xml_diff>

<commit_message>
Add additional protein interface examples
</commit_message>
<xml_diff>
--- a/figures/structures/protein_structure_figures.pptx
+++ b/figures/structures/protein_structure_figures.pptx
@@ -7,7 +7,6 @@
   <p:sldIdLst>
     <p:sldId id="256" r:id="rId2"/>
     <p:sldId id="258" r:id="rId3"/>
-    <p:sldId id="257" r:id="rId4"/>
   </p:sldIdLst>
   <p:sldSz cx="12192000" cy="6858000"/>
   <p:notesSz cx="6858000" cy="9144000"/>
@@ -245,7 +244,7 @@
           <a:p>
             <a:fld id="{7696AFBC-2CDB-4711-9692-11F44B2F2057}" type="datetimeFigureOut">
               <a:rPr lang="en-US" smtClean="0"/>
-              <a:t>7/8/2024</a:t>
+              <a:t>7/12/2024</a:t>
             </a:fld>
             <a:endParaRPr lang="en-US"/>
           </a:p>
@@ -415,7 +414,7 @@
           <a:p>
             <a:fld id="{7696AFBC-2CDB-4711-9692-11F44B2F2057}" type="datetimeFigureOut">
               <a:rPr lang="en-US" smtClean="0"/>
-              <a:t>7/8/2024</a:t>
+              <a:t>7/12/2024</a:t>
             </a:fld>
             <a:endParaRPr lang="en-US"/>
           </a:p>
@@ -595,7 +594,7 @@
           <a:p>
             <a:fld id="{7696AFBC-2CDB-4711-9692-11F44B2F2057}" type="datetimeFigureOut">
               <a:rPr lang="en-US" smtClean="0"/>
-              <a:t>7/8/2024</a:t>
+              <a:t>7/12/2024</a:t>
             </a:fld>
             <a:endParaRPr lang="en-US"/>
           </a:p>
@@ -765,7 +764,7 @@
           <a:p>
             <a:fld id="{7696AFBC-2CDB-4711-9692-11F44B2F2057}" type="datetimeFigureOut">
               <a:rPr lang="en-US" smtClean="0"/>
-              <a:t>7/8/2024</a:t>
+              <a:t>7/12/2024</a:t>
             </a:fld>
             <a:endParaRPr lang="en-US"/>
           </a:p>
@@ -1011,7 +1010,7 @@
           <a:p>
             <a:fld id="{7696AFBC-2CDB-4711-9692-11F44B2F2057}" type="datetimeFigureOut">
               <a:rPr lang="en-US" smtClean="0"/>
-              <a:t>7/8/2024</a:t>
+              <a:t>7/12/2024</a:t>
             </a:fld>
             <a:endParaRPr lang="en-US"/>
           </a:p>
@@ -1243,7 +1242,7 @@
           <a:p>
             <a:fld id="{7696AFBC-2CDB-4711-9692-11F44B2F2057}" type="datetimeFigureOut">
               <a:rPr lang="en-US" smtClean="0"/>
-              <a:t>7/8/2024</a:t>
+              <a:t>7/12/2024</a:t>
             </a:fld>
             <a:endParaRPr lang="en-US"/>
           </a:p>
@@ -1610,7 +1609,7 @@
           <a:p>
             <a:fld id="{7696AFBC-2CDB-4711-9692-11F44B2F2057}" type="datetimeFigureOut">
               <a:rPr lang="en-US" smtClean="0"/>
-              <a:t>7/8/2024</a:t>
+              <a:t>7/12/2024</a:t>
             </a:fld>
             <a:endParaRPr lang="en-US"/>
           </a:p>
@@ -1728,7 +1727,7 @@
           <a:p>
             <a:fld id="{7696AFBC-2CDB-4711-9692-11F44B2F2057}" type="datetimeFigureOut">
               <a:rPr lang="en-US" smtClean="0"/>
-              <a:t>7/8/2024</a:t>
+              <a:t>7/12/2024</a:t>
             </a:fld>
             <a:endParaRPr lang="en-US"/>
           </a:p>
@@ -1823,7 +1822,7 @@
           <a:p>
             <a:fld id="{7696AFBC-2CDB-4711-9692-11F44B2F2057}" type="datetimeFigureOut">
               <a:rPr lang="en-US" smtClean="0"/>
-              <a:t>7/8/2024</a:t>
+              <a:t>7/12/2024</a:t>
             </a:fld>
             <a:endParaRPr lang="en-US"/>
           </a:p>
@@ -2100,7 +2099,7 @@
           <a:p>
             <a:fld id="{7696AFBC-2CDB-4711-9692-11F44B2F2057}" type="datetimeFigureOut">
               <a:rPr lang="en-US" smtClean="0"/>
-              <a:t>7/8/2024</a:t>
+              <a:t>7/12/2024</a:t>
             </a:fld>
             <a:endParaRPr lang="en-US"/>
           </a:p>
@@ -2357,7 +2356,7 @@
           <a:p>
             <a:fld id="{7696AFBC-2CDB-4711-9692-11F44B2F2057}" type="datetimeFigureOut">
               <a:rPr lang="en-US" smtClean="0"/>
-              <a:t>7/8/2024</a:t>
+              <a:t>7/12/2024</a:t>
             </a:fld>
             <a:endParaRPr lang="en-US"/>
           </a:p>
@@ -2570,7 +2569,7 @@
           <a:p>
             <a:fld id="{7696AFBC-2CDB-4711-9692-11F44B2F2057}" type="datetimeFigureOut">
               <a:rPr lang="en-US" smtClean="0"/>
-              <a:t>7/8/2024</a:t>
+              <a:t>7/12/2024</a:t>
             </a:fld>
             <a:endParaRPr lang="en-US"/>
           </a:p>
@@ -4966,479 +4965,6 @@
 </p:sld>
 </file>
 
-<file path=ppt/slides/slide3.xml><?xml version="1.0" encoding="utf-8"?>
-<p:sld xmlns:a="http://schemas.openxmlformats.org/drawingml/2006/main" xmlns:r="http://schemas.openxmlformats.org/officeDocument/2006/relationships" xmlns:p="http://schemas.openxmlformats.org/presentationml/2006/main">
-  <p:cSld>
-    <p:spTree>
-      <p:nvGrpSpPr>
-        <p:cNvPr id="1" name=""/>
-        <p:cNvGrpSpPr/>
-        <p:nvPr/>
-      </p:nvGrpSpPr>
-      <p:grpSpPr>
-        <a:xfrm>
-          <a:off x="0" y="0"/>
-          <a:ext cx="0" cy="0"/>
-          <a:chOff x="0" y="0"/>
-          <a:chExt cx="0" cy="0"/>
-        </a:xfrm>
-      </p:grpSpPr>
-      <p:pic>
-        <p:nvPicPr>
-          <p:cNvPr id="4" name="Picture 3" descr="A green and red string&#10;&#10;Description automatically generated with medium confidence">
-            <a:extLst>
-              <a:ext uri="{FF2B5EF4-FFF2-40B4-BE49-F238E27FC236}">
-                <a16:creationId xmlns:a16="http://schemas.microsoft.com/office/drawing/2014/main" id="{389316C5-D6AC-AFFF-493C-39BE3E17A2DB}"/>
-              </a:ext>
-            </a:extLst>
-          </p:cNvPr>
-          <p:cNvPicPr>
-            <a:picLocks noChangeAspect="1"/>
-          </p:cNvPicPr>
-          <p:nvPr/>
-        </p:nvPicPr>
-        <p:blipFill>
-          <a:blip r:embed="rId2">
-            <a:extLst>
-              <a:ext uri="{28A0092B-C50C-407E-A947-70E740481C1C}">
-                <a14:useLocalDpi xmlns:a14="http://schemas.microsoft.com/office/drawing/2010/main" val="0"/>
-              </a:ext>
-            </a:extLst>
-          </a:blip>
-          <a:stretch>
-            <a:fillRect/>
-          </a:stretch>
-        </p:blipFill>
-        <p:spPr>
-          <a:xfrm>
-            <a:off x="-557247" y="1053163"/>
-            <a:ext cx="4572000" cy="4572000"/>
-          </a:xfrm>
-          <a:prstGeom prst="rect">
-            <a:avLst/>
-          </a:prstGeom>
-          <a:ln w="38100" cap="sq">
-            <a:solidFill>
-              <a:schemeClr val="tx1"/>
-            </a:solidFill>
-            <a:miter lim="800000"/>
-          </a:ln>
-        </p:spPr>
-      </p:pic>
-      <p:sp>
-        <p:nvSpPr>
-          <p:cNvPr id="5" name="Rectangle 4">
-            <a:extLst>
-              <a:ext uri="{FF2B5EF4-FFF2-40B4-BE49-F238E27FC236}">
-                <a16:creationId xmlns:a16="http://schemas.microsoft.com/office/drawing/2014/main" id="{2292289D-1CE5-2BDB-5AAE-D216BA36BEE1}"/>
-              </a:ext>
-            </a:extLst>
-          </p:cNvPr>
-          <p:cNvSpPr/>
-          <p:nvPr/>
-        </p:nvSpPr>
-        <p:spPr>
-          <a:xfrm>
-            <a:off x="-557247" y="1067347"/>
-            <a:ext cx="4572000" cy="296029"/>
-          </a:xfrm>
-          <a:prstGeom prst="rect">
-            <a:avLst/>
-          </a:prstGeom>
-          <a:solidFill>
-            <a:schemeClr val="tx1"/>
-          </a:solidFill>
-          <a:ln w="38100" cap="sq">
-            <a:solidFill>
-              <a:schemeClr val="tx1"/>
-            </a:solidFill>
-            <a:miter lim="800000"/>
-          </a:ln>
-        </p:spPr>
-        <p:style>
-          <a:lnRef idx="2">
-            <a:schemeClr val="accent1">
-              <a:shade val="15000"/>
-            </a:schemeClr>
-          </a:lnRef>
-          <a:fillRef idx="1">
-            <a:schemeClr val="accent1"/>
-          </a:fillRef>
-          <a:effectRef idx="0">
-            <a:schemeClr val="accent1"/>
-          </a:effectRef>
-          <a:fontRef idx="minor">
-            <a:schemeClr val="lt1"/>
-          </a:fontRef>
-        </p:style>
-        <p:txBody>
-          <a:bodyPr rtlCol="0" anchor="ctr"/>
-          <a:lstStyle/>
-          <a:p>
-            <a:pPr algn="ctr"/>
-            <a:r>
-              <a:rPr lang="en-US" dirty="0"/>
-              <a:t>AVFluIgG01 ◄► EPI168674</a:t>
-            </a:r>
-          </a:p>
-        </p:txBody>
-      </p:sp>
-      <p:pic>
-        <p:nvPicPr>
-          <p:cNvPr id="7" name="Picture 6" descr="A close-up of a structure&#10;&#10;Description automatically generated">
-            <a:extLst>
-              <a:ext uri="{FF2B5EF4-FFF2-40B4-BE49-F238E27FC236}">
-                <a16:creationId xmlns:a16="http://schemas.microsoft.com/office/drawing/2014/main" id="{5B0B7E5D-A10B-7B01-3DEA-E8EF2727D9CF}"/>
-              </a:ext>
-            </a:extLst>
-          </p:cNvPr>
-          <p:cNvPicPr>
-            <a:picLocks noChangeAspect="1"/>
-          </p:cNvPicPr>
-          <p:nvPr/>
-        </p:nvPicPr>
-        <p:blipFill>
-          <a:blip r:embed="rId3">
-            <a:extLst>
-              <a:ext uri="{28A0092B-C50C-407E-A947-70E740481C1C}">
-                <a14:useLocalDpi xmlns:a14="http://schemas.microsoft.com/office/drawing/2010/main" val="0"/>
-              </a:ext>
-            </a:extLst>
-          </a:blip>
-          <a:stretch>
-            <a:fillRect/>
-          </a:stretch>
-        </p:blipFill>
-        <p:spPr>
-          <a:xfrm>
-            <a:off x="4052683" y="1053163"/>
-            <a:ext cx="4572000" cy="4572000"/>
-          </a:xfrm>
-          <a:prstGeom prst="rect">
-            <a:avLst/>
-          </a:prstGeom>
-          <a:ln w="38100" cap="sq">
-            <a:solidFill>
-              <a:schemeClr val="tx1"/>
-            </a:solidFill>
-            <a:miter lim="800000"/>
-          </a:ln>
-        </p:spPr>
-      </p:pic>
-      <p:sp>
-        <p:nvSpPr>
-          <p:cNvPr id="8" name="Rectangle 7">
-            <a:extLst>
-              <a:ext uri="{FF2B5EF4-FFF2-40B4-BE49-F238E27FC236}">
-                <a16:creationId xmlns:a16="http://schemas.microsoft.com/office/drawing/2014/main" id="{01681B20-A97A-48BF-5206-DEB5FA4DDA24}"/>
-              </a:ext>
-            </a:extLst>
-          </p:cNvPr>
-          <p:cNvSpPr/>
-          <p:nvPr/>
-        </p:nvSpPr>
-        <p:spPr>
-          <a:xfrm>
-            <a:off x="4052683" y="1067347"/>
-            <a:ext cx="4572000" cy="296029"/>
-          </a:xfrm>
-          <a:prstGeom prst="rect">
-            <a:avLst/>
-          </a:prstGeom>
-          <a:solidFill>
-            <a:schemeClr val="tx1"/>
-          </a:solidFill>
-          <a:ln w="38100" cap="sq">
-            <a:solidFill>
-              <a:schemeClr val="tx1"/>
-            </a:solidFill>
-            <a:miter lim="800000"/>
-          </a:ln>
-        </p:spPr>
-        <p:style>
-          <a:lnRef idx="2">
-            <a:schemeClr val="accent1">
-              <a:shade val="15000"/>
-            </a:schemeClr>
-          </a:lnRef>
-          <a:fillRef idx="1">
-            <a:schemeClr val="accent1"/>
-          </a:fillRef>
-          <a:effectRef idx="0">
-            <a:schemeClr val="accent1"/>
-          </a:effectRef>
-          <a:fontRef idx="minor">
-            <a:schemeClr val="lt1"/>
-          </a:fontRef>
-        </p:style>
-        <p:txBody>
-          <a:bodyPr rtlCol="0" anchor="ctr"/>
-          <a:lstStyle/>
-          <a:p>
-            <a:pPr algn="ctr"/>
-            <a:r>
-              <a:rPr lang="en-US" dirty="0"/>
-              <a:t>100F4 ◄► EPI2429052</a:t>
-            </a:r>
-          </a:p>
-        </p:txBody>
-      </p:sp>
-      <p:pic>
-        <p:nvPicPr>
-          <p:cNvPr id="10" name="Picture 9" descr="A green and red plant&#10;&#10;Description automatically generated">
-            <a:extLst>
-              <a:ext uri="{FF2B5EF4-FFF2-40B4-BE49-F238E27FC236}">
-                <a16:creationId xmlns:a16="http://schemas.microsoft.com/office/drawing/2014/main" id="{F8362B7D-EF07-DBEF-6244-F08A832D3FAE}"/>
-              </a:ext>
-            </a:extLst>
-          </p:cNvPr>
-          <p:cNvPicPr>
-            <a:picLocks noChangeAspect="1"/>
-          </p:cNvPicPr>
-          <p:nvPr/>
-        </p:nvPicPr>
-        <p:blipFill>
-          <a:blip r:embed="rId4">
-            <a:extLst>
-              <a:ext uri="{28A0092B-C50C-407E-A947-70E740481C1C}">
-                <a14:useLocalDpi xmlns:a14="http://schemas.microsoft.com/office/drawing/2010/main" val="0"/>
-              </a:ext>
-            </a:extLst>
-          </a:blip>
-          <a:stretch>
-            <a:fillRect/>
-          </a:stretch>
-        </p:blipFill>
-        <p:spPr>
-          <a:xfrm>
-            <a:off x="8662613" y="1053163"/>
-            <a:ext cx="4572000" cy="4572000"/>
-          </a:xfrm>
-          <a:prstGeom prst="rect">
-            <a:avLst/>
-          </a:prstGeom>
-          <a:ln w="38100" cap="sq">
-            <a:solidFill>
-              <a:schemeClr val="tx1"/>
-            </a:solidFill>
-            <a:miter lim="800000"/>
-          </a:ln>
-        </p:spPr>
-      </p:pic>
-      <p:sp>
-        <p:nvSpPr>
-          <p:cNvPr id="11" name="Rectangle 10">
-            <a:extLst>
-              <a:ext uri="{FF2B5EF4-FFF2-40B4-BE49-F238E27FC236}">
-                <a16:creationId xmlns:a16="http://schemas.microsoft.com/office/drawing/2014/main" id="{1D9947C8-2503-B55A-38B6-2FACE553E8D3}"/>
-              </a:ext>
-            </a:extLst>
-          </p:cNvPr>
-          <p:cNvSpPr/>
-          <p:nvPr/>
-        </p:nvSpPr>
-        <p:spPr>
-          <a:xfrm>
-            <a:off x="8662613" y="1067347"/>
-            <a:ext cx="4572000" cy="296029"/>
-          </a:xfrm>
-          <a:prstGeom prst="rect">
-            <a:avLst/>
-          </a:prstGeom>
-          <a:solidFill>
-            <a:schemeClr val="tx1"/>
-          </a:solidFill>
-          <a:ln w="38100" cap="sq">
-            <a:solidFill>
-              <a:schemeClr val="tx1"/>
-            </a:solidFill>
-            <a:miter lim="800000"/>
-          </a:ln>
-        </p:spPr>
-        <p:style>
-          <a:lnRef idx="2">
-            <a:schemeClr val="accent1">
-              <a:shade val="15000"/>
-            </a:schemeClr>
-          </a:lnRef>
-          <a:fillRef idx="1">
-            <a:schemeClr val="accent1"/>
-          </a:fillRef>
-          <a:effectRef idx="0">
-            <a:schemeClr val="accent1"/>
-          </a:effectRef>
-          <a:fontRef idx="minor">
-            <a:schemeClr val="lt1"/>
-          </a:fontRef>
-        </p:style>
-        <p:txBody>
-          <a:bodyPr rtlCol="0" anchor="ctr"/>
-          <a:lstStyle/>
-          <a:p>
-            <a:pPr algn="ctr"/>
-            <a:r>
-              <a:rPr lang="en-US" dirty="0"/>
-              <a:t>13D4 ◄► EPI3358339</a:t>
-            </a:r>
-          </a:p>
-        </p:txBody>
-      </p:sp>
-      <p:sp>
-        <p:nvSpPr>
-          <p:cNvPr id="13" name="TextBox 12">
-            <a:extLst>
-              <a:ext uri="{FF2B5EF4-FFF2-40B4-BE49-F238E27FC236}">
-                <a16:creationId xmlns:a16="http://schemas.microsoft.com/office/drawing/2014/main" id="{371B2D92-7646-5450-B6C9-A1B8C50123E4}"/>
-              </a:ext>
-            </a:extLst>
-          </p:cNvPr>
-          <p:cNvSpPr txBox="1"/>
-          <p:nvPr/>
-        </p:nvSpPr>
-        <p:spPr>
-          <a:xfrm>
-            <a:off x="-557247" y="5643459"/>
-            <a:ext cx="4572000" cy="646331"/>
-          </a:xfrm>
-          <a:prstGeom prst="rect">
-            <a:avLst/>
-          </a:prstGeom>
-          <a:noFill/>
-        </p:spPr>
-        <p:txBody>
-          <a:bodyPr wrap="square" rtlCol="0">
-            <a:spAutoFit/>
-          </a:bodyPr>
-          <a:lstStyle/>
-          <a:p>
-            <a:pPr algn="ctr"/>
-            <a:r>
-              <a:rPr lang="en-US" dirty="0"/>
-              <a:t>K159, H189, D190, E191,</a:t>
-            </a:r>
-          </a:p>
-          <a:p>
-            <a:pPr algn="ctr"/>
-            <a:r>
-              <a:rPr lang="en-US" dirty="0"/>
-              <a:t>A192, K196, K225, S231</a:t>
-            </a:r>
-          </a:p>
-        </p:txBody>
-      </p:sp>
-      <p:sp>
-        <p:nvSpPr>
-          <p:cNvPr id="14" name="TextBox 13">
-            <a:extLst>
-              <a:ext uri="{FF2B5EF4-FFF2-40B4-BE49-F238E27FC236}">
-                <a16:creationId xmlns:a16="http://schemas.microsoft.com/office/drawing/2014/main" id="{C2CA8FA4-1AC7-2D5B-7D7A-A196CD750BE8}"/>
-              </a:ext>
-            </a:extLst>
-          </p:cNvPr>
-          <p:cNvSpPr txBox="1"/>
-          <p:nvPr/>
-        </p:nvSpPr>
-        <p:spPr>
-          <a:xfrm>
-            <a:off x="8662613" y="5639347"/>
-            <a:ext cx="4572000" cy="923330"/>
-          </a:xfrm>
-          <a:prstGeom prst="rect">
-            <a:avLst/>
-          </a:prstGeom>
-          <a:noFill/>
-        </p:spPr>
-        <p:txBody>
-          <a:bodyPr wrap="square" rtlCol="0">
-            <a:spAutoFit/>
-          </a:bodyPr>
-          <a:lstStyle/>
-          <a:p>
-            <a:pPr algn="ctr"/>
-            <a:r>
-              <a:rPr lang="en-US" dirty="0"/>
-              <a:t>D133, V136, S140, E147, S148,</a:t>
-            </a:r>
-          </a:p>
-          <a:p>
-            <a:pPr algn="ctr"/>
-            <a:r>
-              <a:rPr lang="en-US" dirty="0"/>
-              <a:t>N161, D162, D190, T192, R196,</a:t>
-            </a:r>
-          </a:p>
-          <a:p>
-            <a:pPr algn="ctr"/>
-            <a:r>
-              <a:rPr lang="en-US" dirty="0"/>
-              <a:t>Q225, G228, Q229, R230</a:t>
-            </a:r>
-          </a:p>
-        </p:txBody>
-      </p:sp>
-      <p:sp>
-        <p:nvSpPr>
-          <p:cNvPr id="15" name="TextBox 14">
-            <a:extLst>
-              <a:ext uri="{FF2B5EF4-FFF2-40B4-BE49-F238E27FC236}">
-                <a16:creationId xmlns:a16="http://schemas.microsoft.com/office/drawing/2014/main" id="{633426FE-952E-A6A9-70A4-EFEB912D1823}"/>
-              </a:ext>
-            </a:extLst>
-          </p:cNvPr>
-          <p:cNvSpPr txBox="1"/>
-          <p:nvPr/>
-        </p:nvSpPr>
-        <p:spPr>
-          <a:xfrm>
-            <a:off x="4052683" y="5643459"/>
-            <a:ext cx="4572000" cy="923330"/>
-          </a:xfrm>
-          <a:prstGeom prst="rect">
-            <a:avLst/>
-          </a:prstGeom>
-          <a:noFill/>
-        </p:spPr>
-        <p:txBody>
-          <a:bodyPr wrap="square" rtlCol="0">
-            <a:spAutoFit/>
-          </a:bodyPr>
-          <a:lstStyle/>
-          <a:p>
-            <a:pPr algn="ctr"/>
-            <a:r>
-              <a:rPr lang="en-US" dirty="0"/>
-              <a:t>R152, N153, Q214, K219,</a:t>
-            </a:r>
-          </a:p>
-          <a:p>
-            <a:pPr algn="ctr"/>
-            <a:r>
-              <a:rPr lang="en-US" dirty="0"/>
-              <a:t>R223, S224, Q225, N227,</a:t>
-            </a:r>
-          </a:p>
-          <a:p>
-            <a:pPr algn="ctr"/>
-            <a:r>
-              <a:rPr lang="en-US" dirty="0"/>
-              <a:t>M233, D234, F235, W237</a:t>
-            </a:r>
-          </a:p>
-        </p:txBody>
-      </p:sp>
-    </p:spTree>
-    <p:extLst>
-      <p:ext uri="{BB962C8B-B14F-4D97-AF65-F5344CB8AC3E}">
-        <p14:creationId xmlns:p14="http://schemas.microsoft.com/office/powerpoint/2010/main" val="3855827971"/>
-      </p:ext>
-    </p:extLst>
-  </p:cSld>
-  <p:clrMapOvr>
-    <a:masterClrMapping/>
-  </p:clrMapOvr>
-</p:sld>
-</file>
-
 <file path=ppt/theme/theme1.xml><?xml version="1.0" encoding="utf-8"?>
 <a:theme xmlns:a="http://schemas.openxmlformats.org/drawingml/2006/main" name="Office Theme">
   <a:themeElements>

</xml_diff>